<commit_message>
1.把 modeling 中 lane polyline node feature 的计算与 agent trajectory polyline node feature 的计算合并. 2.更新了 presentation.pptx 部分关于个人研究兴趣的内容. 3.把训练脚本基本完善
</commit_message>
<xml_diff>
--- a/material/presentation.pptx
+++ b/material/presentation.pptx
@@ -5170,7 +5170,7 @@
         <p:spPr>
           <a:xfrm>
             <a:off x="992221" y="1258242"/>
-            <a:ext cx="10798790" cy="5027017"/>
+            <a:ext cx="10798790" cy="6689011"/>
           </a:xfrm>
           <a:prstGeom prst="rect">
             <a:avLst/>
@@ -5225,8 +5225,19 @@
                 <a:latin typeface="Arial" panose="020B0604020202020204" pitchFamily="34" charset="0"/>
                 <a:cs typeface="Arial" panose="020B0604020202020204" pitchFamily="34" charset="0"/>
               </a:rPr>
-              <a:t>: Self-driving is also practical. Self-driving can largely improve the people transport. Although it’s difficult, I’m willing to be faced with it. At last, I express my opinions on research. I don’t want to be a researcher who just see computer vision as paper generator. I want to do meaningful, practical research! I want to do high-quality, more advanced research! I want to do real research!</a:t>
-            </a:r>
+              <a:t>: Self-driving is also practical. Self-driving can largely improve the people transport. Self-driving needs a compound of technology about machine learning so that it may be difficult. Although it’s difficult, I’m willing to be faced with it. At last, I express my opinions on research. I don’t want to be a researcher who just see computer vision as paper generator. I want to do meaningful, practical research! I want to do high-quality, more advanced research! I want to do real research! As you can see, I also publish some low-quality paper which just modify the network and just get the performance a little improvement. But I have to do that. Because It’s the entrance. If I don’t do that, I even can’t qualify for the summer camp. It’s the entrance to higher research. </a:t>
+            </a:r>
+            <a:r>
+              <a:rPr lang="en-US" altLang="zh-CN">
+                <a:latin typeface="Arial" panose="020B0604020202020204" pitchFamily="34" charset="0"/>
+                <a:cs typeface="Arial" panose="020B0604020202020204" pitchFamily="34" charset="0"/>
+              </a:rPr>
+              <a:t>So I have to do that.</a:t>
+            </a:r>
+            <a:endParaRPr lang="en-US" altLang="zh-CN" dirty="0">
+              <a:latin typeface="Arial" panose="020B0604020202020204" pitchFamily="34" charset="0"/>
+              <a:cs typeface="Arial" panose="020B0604020202020204" pitchFamily="34" charset="0"/>
+            </a:endParaRPr>
           </a:p>
           <a:p>
             <a:pPr algn="just">

</xml_diff>

<commit_message>
presentation 的 ppt 和 pdf 有更新。
</commit_message>
<xml_diff>
--- a/material/presentation.pptx
+++ b/material/presentation.pptx
@@ -16,6 +16,8 @@
     <p:sldId id="262" r:id="rId10"/>
     <p:sldId id="265" r:id="rId11"/>
     <p:sldId id="266" r:id="rId12"/>
+    <p:sldId id="267" r:id="rId13"/>
+    <p:sldId id="268" r:id="rId14"/>
   </p:sldIdLst>
   <p:sldSz cx="12192000" cy="6858000"/>
   <p:notesSz cx="6858000" cy="9144000"/>
@@ -4646,7 +4648,7 @@
 </p:sld>
 </file>
 
-<file path=ppt/slides/slide2.xml><?xml version="1.0" encoding="utf-8"?>
+<file path=ppt/slides/slide12.xml><?xml version="1.0" encoding="utf-8"?>
 <p:sld xmlns:a="http://schemas.openxmlformats.org/drawingml/2006/main" xmlns:r="http://schemas.openxmlformats.org/officeDocument/2006/relationships" xmlns:p="http://schemas.openxmlformats.org/presentationml/2006/main">
   <p:cSld>
     <p:spTree>
@@ -4777,7 +4779,7 @@
         <p:spPr>
           <a:xfrm>
             <a:off x="992221" y="669303"/>
-            <a:ext cx="1014060" cy="369332"/>
+            <a:ext cx="1826141" cy="369332"/>
           </a:xfrm>
           <a:prstGeom prst="rect">
             <a:avLst/>
@@ -4795,7 +4797,7 @@
                 <a:latin typeface="Arial" panose="020B0604020202020204" pitchFamily="34" charset="0"/>
                 <a:cs typeface="Arial" panose="020B0604020202020204" pitchFamily="34" charset="0"/>
               </a:rPr>
-              <a:t>Awards</a:t>
+              <a:t>Other methods</a:t>
             </a:r>
             <a:endParaRPr lang="zh-CN" altLang="en-US" b="1" dirty="0">
               <a:latin typeface="Arial" panose="020B0604020202020204" pitchFamily="34" charset="0"/>
@@ -4819,7 +4821,7 @@
         <p:spPr>
           <a:xfrm>
             <a:off x="992221" y="1258242"/>
-            <a:ext cx="10798790" cy="2970557"/>
+            <a:ext cx="10428051" cy="5586658"/>
           </a:xfrm>
           <a:prstGeom prst="rect">
             <a:avLst/>
@@ -4834,8 +4836,9 @@
           <a:p>
             <a:pPr marL="342900" indent="-342900" algn="just">
               <a:lnSpc>
-                <a:spcPct val="200000"/>
+                <a:spcPct val="150000"/>
               </a:lnSpc>
+              <a:buFontTx/>
               <a:buAutoNum type="arabicPeriod"/>
             </a:pPr>
             <a:r>
@@ -4843,13 +4846,13 @@
                 <a:latin typeface="Arial" panose="020B0604020202020204" pitchFamily="34" charset="0"/>
                 <a:cs typeface="Arial" panose="020B0604020202020204" pitchFamily="34" charset="0"/>
               </a:rPr>
-              <a:t>National Scholarship (2017 ~ 2018) [Intellectual education: 1st, Comprehensive assessment: 1st]</a:t>
+              <a:t>Fast and Furious (a end-to-end compound of regular computer vision task)</a:t>
             </a:r>
           </a:p>
           <a:p>
             <a:pPr marL="342900" indent="-342900" algn="just">
               <a:lnSpc>
-                <a:spcPct val="200000"/>
+                <a:spcPct val="150000"/>
               </a:lnSpc>
               <a:buAutoNum type="arabicPeriod"/>
             </a:pPr>
@@ -4858,13 +4861,13 @@
                 <a:latin typeface="Arial" panose="020B0604020202020204" pitchFamily="34" charset="0"/>
                 <a:cs typeface="Arial" panose="020B0604020202020204" pitchFamily="34" charset="0"/>
               </a:rPr>
-              <a:t>The Second Prize Scholarship (2018 ~ 2019) [Intellectual education: 1st, Comprehensive assessment: 3st]</a:t>
+              <a:t>IntentNet (an improved FaF by adding rendered HD map)</a:t>
             </a:r>
           </a:p>
           <a:p>
             <a:pPr marL="342900" indent="-342900" algn="just">
               <a:lnSpc>
-                <a:spcPct val="200000"/>
+                <a:spcPct val="150000"/>
               </a:lnSpc>
               <a:buAutoNum type="arabicPeriod"/>
             </a:pPr>
@@ -4873,28 +4876,39 @@
                 <a:latin typeface="Arial" panose="020B0604020202020204" pitchFamily="34" charset="0"/>
                 <a:cs typeface="Arial" panose="020B0604020202020204" pitchFamily="34" charset="0"/>
               </a:rPr>
-              <a:t>Cstro 16th Conference -- AI and Big Data Part -- ROI Segmentation Challenge -- Head and Neck OAR track -- Champion</a:t>
+              <a:t>Rules of the Road (modeling the semantic label by convolution)</a:t>
             </a:r>
           </a:p>
           <a:p>
             <a:pPr marL="342900" indent="-342900" algn="just">
               <a:lnSpc>
-                <a:spcPct val="200000"/>
+                <a:spcPct val="150000"/>
               </a:lnSpc>
               <a:buAutoNum type="arabicPeriod"/>
+            </a:pPr>
+            <a:endParaRPr lang="en-US" altLang="zh-CN" sz="1600" dirty="0">
+              <a:latin typeface="Arial" panose="020B0604020202020204" pitchFamily="34" charset="0"/>
+              <a:cs typeface="Arial" panose="020B0604020202020204" pitchFamily="34" charset="0"/>
+            </a:endParaRPr>
+          </a:p>
+          <a:p>
+            <a:pPr algn="just">
+              <a:lnSpc>
+                <a:spcPct val="150000"/>
+              </a:lnSpc>
             </a:pPr>
             <a:r>
               <a:rPr lang="en-US" altLang="zh-CN" sz="1600" dirty="0">
                 <a:latin typeface="Arial" panose="020B0604020202020204" pitchFamily="34" charset="0"/>
                 <a:cs typeface="Arial" panose="020B0604020202020204" pitchFamily="34" charset="0"/>
               </a:rPr>
-              <a:t>National College Students Mathematical Modeling Competition Provincial Third Prize</a:t>
+              <a:t>Detailed:</a:t>
             </a:r>
           </a:p>
           <a:p>
             <a:pPr marL="342900" indent="-342900" algn="just">
               <a:lnSpc>
-                <a:spcPct val="200000"/>
+                <a:spcPct val="150000"/>
               </a:lnSpc>
               <a:buAutoNum type="arabicPeriod"/>
             </a:pPr>
@@ -4903,7 +4917,37 @@
                 <a:latin typeface="Arial" panose="020B0604020202020204" pitchFamily="34" charset="0"/>
                 <a:cs typeface="Arial" panose="020B0604020202020204" pitchFamily="34" charset="0"/>
               </a:rPr>
-              <a:t>Taidi Cup 8th Data Mining Challenge Second Prize</a:t>
+              <a:t>Firstly, converting the Lidar 3D point clouds as 3D tensor which is a type of regular data which can be encoded by ConvNet. Then stacking 5 timestamps voxelized point clouds as a block. Inputting this block into the ConvNet and the ConvNet will output current and future bounding box.</a:t>
+            </a:r>
+          </a:p>
+          <a:p>
+            <a:pPr marL="342900" indent="-342900" algn="just">
+              <a:lnSpc>
+                <a:spcPct val="150000"/>
+              </a:lnSpc>
+              <a:buAutoNum type="arabicPeriod"/>
+            </a:pPr>
+            <a:r>
+              <a:rPr lang="en-US" altLang="zh-CN" sz="1600" dirty="0">
+                <a:latin typeface="Arial" panose="020B0604020202020204" pitchFamily="34" charset="0"/>
+                <a:cs typeface="Arial" panose="020B0604020202020204" pitchFamily="34" charset="0"/>
+              </a:rPr>
+              <a:t>The method of this paper is really similar to the IntentNet. Except inputting voxelized point clouds, they also input rasterized map. Besides, they also perform a new task intention classification and the output format is different with FaF. They directly output the trajectory points.</a:t>
+            </a:r>
+          </a:p>
+          <a:p>
+            <a:pPr marL="342900" indent="-342900" algn="just">
+              <a:lnSpc>
+                <a:spcPct val="150000"/>
+              </a:lnSpc>
+              <a:buAutoNum type="arabicPeriod"/>
+            </a:pPr>
+            <a:r>
+              <a:rPr lang="en-US" altLang="zh-CN" sz="1600" dirty="0">
+                <a:latin typeface="Arial" panose="020B0604020202020204" pitchFamily="34" charset="0"/>
+                <a:cs typeface="Arial" panose="020B0604020202020204" pitchFamily="34" charset="0"/>
+              </a:rPr>
+              <a:t>They deliver the scene representation into the network by just inputting rasterized map. Besides, they input the motion state scales of target entity and other entities like velocity, acceleration etc. The network of them will output probabilistic grid map which denote the entity state probability of each position. In fact, they also have other different output format like trajectory points. </a:t>
             </a:r>
           </a:p>
         </p:txBody>
@@ -4911,7 +4955,7 @@
     </p:spTree>
     <p:extLst>
       <p:ext uri="{BB962C8B-B14F-4D97-AF65-F5344CB8AC3E}">
-        <p14:creationId xmlns:p14="http://schemas.microsoft.com/office/powerpoint/2010/main" val="787618689"/>
+        <p14:creationId xmlns:p14="http://schemas.microsoft.com/office/powerpoint/2010/main" val="899886768"/>
       </p:ext>
     </p:extLst>
   </p:cSld>
@@ -4921,7 +4965,7 @@
 </p:sld>
 </file>
 
-<file path=ppt/slides/slide3.xml><?xml version="1.0" encoding="utf-8"?>
+<file path=ppt/slides/slide13.xml><?xml version="1.0" encoding="utf-8"?>
 <p:sld xmlns:a="http://schemas.openxmlformats.org/drawingml/2006/main" xmlns:r="http://schemas.openxmlformats.org/officeDocument/2006/relationships" xmlns:p="http://schemas.openxmlformats.org/presentationml/2006/main">
   <p:cSld>
     <p:spTree>
@@ -5052,7 +5096,7 @@
         <p:spPr>
           <a:xfrm>
             <a:off x="992221" y="669303"/>
-            <a:ext cx="2646878" cy="369332"/>
+            <a:ext cx="1313180" cy="369332"/>
           </a:xfrm>
           <a:prstGeom prst="rect">
             <a:avLst/>
@@ -5070,7 +5114,7 @@
                 <a:latin typeface="Arial" panose="020B0604020202020204" pitchFamily="34" charset="0"/>
                 <a:cs typeface="Arial" panose="020B0604020202020204" pitchFamily="34" charset="0"/>
               </a:rPr>
-              <a:t>Research Experiences</a:t>
+              <a:t>My feeling</a:t>
             </a:r>
             <a:endParaRPr lang="zh-CN" altLang="en-US" b="1" dirty="0">
               <a:latin typeface="Arial" panose="020B0604020202020204" pitchFamily="34" charset="0"/>
@@ -5081,10 +5125,10 @@
       </p:sp>
       <p:sp>
         <p:nvSpPr>
-          <p:cNvPr id="9" name="文本框 8">
-            <a:extLst>
-              <a:ext uri="{FF2B5EF4-FFF2-40B4-BE49-F238E27FC236}">
-                <a16:creationId xmlns:a16="http://schemas.microsoft.com/office/drawing/2014/main" id="{B829983B-D66B-4BAE-95AE-CD2D4EA6EF57}"/>
+          <p:cNvPr id="8" name="文本框 7">
+            <a:extLst>
+              <a:ext uri="{FF2B5EF4-FFF2-40B4-BE49-F238E27FC236}">
+                <a16:creationId xmlns:a16="http://schemas.microsoft.com/office/drawing/2014/main" id="{D747C2E3-2AAD-4AA6-B118-7BFF22A3EE41}"/>
               </a:ext>
             </a:extLst>
           </p:cNvPr>
@@ -5094,7 +5138,7 @@
         <p:spPr>
           <a:xfrm>
             <a:off x="992221" y="1258242"/>
-            <a:ext cx="10798790" cy="4968027"/>
+            <a:ext cx="10428051" cy="3370666"/>
           </a:xfrm>
           <a:prstGeom prst="rect">
             <a:avLst/>
@@ -5107,136 +5151,17 @@
           </a:bodyPr>
           <a:lstStyle/>
           <a:p>
-            <a:pPr marL="342900" indent="-342900" algn="just">
-              <a:lnSpc>
-                <a:spcPct val="200000"/>
-              </a:lnSpc>
-              <a:buAutoNum type="arabicPeriod"/>
-            </a:pPr>
-            <a:r>
-              <a:rPr lang="en-US" altLang="zh-CN" sz="1600" dirty="0">
-                <a:latin typeface="Arial" panose="020B0604020202020204" pitchFamily="34" charset="0"/>
-                <a:cs typeface="Arial" panose="020B0604020202020204" pitchFamily="34" charset="0"/>
-              </a:rPr>
-              <a:t>Multi-media Emotion Recognition (SRP project From 2019.6 to 2020.4)</a:t>
-            </a:r>
-          </a:p>
-          <a:p>
-            <a:pPr marL="342900" indent="-342900" algn="just">
-              <a:lnSpc>
-                <a:spcPct val="200000"/>
-              </a:lnSpc>
-              <a:buAutoNum type="arabicPeriod"/>
-            </a:pPr>
-            <a:r>
-              <a:rPr lang="en-US" altLang="zh-CN" sz="1600" dirty="0">
-                <a:latin typeface="Arial" panose="020B0604020202020204" pitchFamily="34" charset="0"/>
-                <a:cs typeface="Arial" panose="020B0604020202020204" pitchFamily="34" charset="0"/>
-              </a:rPr>
-              <a:t>Sun Yat-sen University Cancer Center Research Assistant (From 2019.8 to now)</a:t>
-            </a:r>
-          </a:p>
-          <a:p>
-            <a:pPr marL="342900" indent="-342900" algn="just">
-              <a:lnSpc>
-                <a:spcPct val="200000"/>
-              </a:lnSpc>
-              <a:buAutoNum type="arabicPeriod"/>
-            </a:pPr>
-            <a:r>
-              <a:rPr lang="en-US" altLang="zh-CN" sz="1600" dirty="0">
-                <a:latin typeface="Arial" panose="020B0604020202020204" pitchFamily="34" charset="0"/>
-                <a:cs typeface="Arial" panose="020B0604020202020204" pitchFamily="34" charset="0"/>
-              </a:rPr>
-              <a:t>SCUT-Robot lab Member of vision group (From 2019.9 to now) </a:t>
-            </a:r>
-          </a:p>
-          <a:p>
-            <a:pPr marL="342900" indent="-342900" algn="just">
-              <a:lnSpc>
-                <a:spcPct val="150000"/>
-              </a:lnSpc>
-              <a:buAutoNum type="arabicPeriod"/>
-            </a:pPr>
-            <a:endParaRPr lang="en-US" altLang="zh-CN" dirty="0">
-              <a:latin typeface="Arial" panose="020B0604020202020204" pitchFamily="34" charset="0"/>
-              <a:cs typeface="Arial" panose="020B0604020202020204" pitchFamily="34" charset="0"/>
-            </a:endParaRPr>
-          </a:p>
-          <a:p>
             <a:pPr algn="just">
               <a:lnSpc>
                 <a:spcPct val="150000"/>
               </a:lnSpc>
             </a:pPr>
             <a:r>
-              <a:rPr lang="en-US" altLang="zh-CN" dirty="0">
-                <a:latin typeface="Arial" panose="020B0604020202020204" pitchFamily="34" charset="0"/>
-                <a:cs typeface="Arial" panose="020B0604020202020204" pitchFamily="34" charset="0"/>
-              </a:rPr>
-              <a:t>Detailed:</a:t>
-            </a:r>
-          </a:p>
-          <a:p>
-            <a:pPr algn="just">
-              <a:lnSpc>
-                <a:spcPct val="120000"/>
-              </a:lnSpc>
-              <a:spcAft>
-                <a:spcPts val="600"/>
-              </a:spcAft>
-            </a:pPr>
-            <a:r>
               <a:rPr lang="en-US" altLang="zh-CN" sz="1600" dirty="0">
                 <a:latin typeface="Arial" panose="020B0604020202020204" pitchFamily="34" charset="0"/>
                 <a:cs typeface="Arial" panose="020B0604020202020204" pitchFamily="34" charset="0"/>
               </a:rPr>
-              <a:t>1. In this project, I’m mainly in charge of implementation. We try to use neural network to extract the emotion feature representation from Multi-media data like image, video etc. Then we use regression and classification model to model the </a:t>
-            </a:r>
-            <a:r>
-              <a:rPr lang="en-US" altLang="zh-CN" sz="1600">
-                <a:latin typeface="Arial" panose="020B0604020202020204" pitchFamily="34" charset="0"/>
-                <a:cs typeface="Arial" panose="020B0604020202020204" pitchFamily="34" charset="0"/>
-              </a:rPr>
-              <a:t>emotion state.</a:t>
-            </a:r>
-            <a:endParaRPr lang="en-US" altLang="zh-CN" sz="1600" dirty="0">
-              <a:latin typeface="Arial" panose="020B0604020202020204" pitchFamily="34" charset="0"/>
-              <a:cs typeface="Arial" panose="020B0604020202020204" pitchFamily="34" charset="0"/>
-            </a:endParaRPr>
-          </a:p>
-          <a:p>
-            <a:pPr algn="just">
-              <a:lnSpc>
-                <a:spcPct val="120000"/>
-              </a:lnSpc>
-              <a:spcAft>
-                <a:spcPts val="600"/>
-              </a:spcAft>
-            </a:pPr>
-            <a:r>
-              <a:rPr lang="en-US" altLang="zh-CN" sz="1600" dirty="0">
-                <a:latin typeface="Arial" panose="020B0604020202020204" pitchFamily="34" charset="0"/>
-                <a:cs typeface="Arial" panose="020B0604020202020204" pitchFamily="34" charset="0"/>
-              </a:rPr>
-              <a:t>2. I’m the research assistant of MIACA research group Sun Yat-sen University Cancer Center. I focus on medical image segmentation especially multi-modality medical image segmentation. Besides, I am also interested in medical image registration and medical image generation.</a:t>
-            </a:r>
-          </a:p>
-          <a:p>
-            <a:pPr algn="just">
-              <a:lnSpc>
-                <a:spcPct val="120000"/>
-              </a:lnSpc>
-              <a:spcAft>
-                <a:spcPts val="600"/>
-              </a:spcAft>
-            </a:pPr>
-            <a:r>
-              <a:rPr lang="en-US" altLang="zh-CN" sz="1600" dirty="0">
-                <a:latin typeface="Arial" panose="020B0604020202020204" pitchFamily="34" charset="0"/>
-                <a:cs typeface="Arial" panose="020B0604020202020204" pitchFamily="34" charset="0"/>
-              </a:rPr>
-              <a:t>3. I’m a member of Vision Group. I’m mainly in charge of base station. Base station can use object detection, object track and motion forecasting to strategy calculation so that it can provide some strategy support for other robots.</a:t>
+              <a:t>        Motion forecasting is a very important task in self-driving domain. Because, the autonomous vehicle have to share roads with human drivers who are really stochastic. The main aim of motion forecasting is to avoid the autonomous vehicle crashing with other vehicles. But the main problem of motion forecasting is that there is not a unified representation which can model the road context and other vehicle motions. Before VectorNet, researchers try to rasterize this information because they really want to use ConvNet to encode them. But VectorNet, I think, is really innovative and efficient. VectorNet is more straightforward to utilize the structed HD map. However, VectorNet also have problem. It may be too idealistic. Because the structed HD map may difficult to get in real-time. Besides, the observed trajectory of agent is also difficult to acquire in real-time. So There is still a gap to let VectorNet equipped in the autonomous vehicle.</a:t>
             </a:r>
           </a:p>
         </p:txBody>
@@ -5244,7 +5169,7 @@
     </p:spTree>
     <p:extLst>
       <p:ext uri="{BB962C8B-B14F-4D97-AF65-F5344CB8AC3E}">
-        <p14:creationId xmlns:p14="http://schemas.microsoft.com/office/powerpoint/2010/main" val="2830355095"/>
+        <p14:creationId xmlns:p14="http://schemas.microsoft.com/office/powerpoint/2010/main" val="2096972689"/>
       </p:ext>
     </p:extLst>
   </p:cSld>
@@ -5254,7 +5179,7 @@
 </p:sld>
 </file>
 
-<file path=ppt/slides/slide4.xml><?xml version="1.0" encoding="utf-8"?>
+<file path=ppt/slides/slide2.xml><?xml version="1.0" encoding="utf-8"?>
 <p:sld xmlns:a="http://schemas.openxmlformats.org/drawingml/2006/main" xmlns:r="http://schemas.openxmlformats.org/officeDocument/2006/relationships" xmlns:p="http://schemas.openxmlformats.org/presentationml/2006/main">
   <p:cSld>
     <p:spTree>
@@ -5385,7 +5310,7 @@
         <p:spPr>
           <a:xfrm>
             <a:off x="992221" y="669303"/>
-            <a:ext cx="1556836" cy="369332"/>
+            <a:ext cx="1014060" cy="369332"/>
           </a:xfrm>
           <a:prstGeom prst="rect">
             <a:avLst/>
@@ -5403,7 +5328,7 @@
                 <a:latin typeface="Arial" panose="020B0604020202020204" pitchFamily="34" charset="0"/>
                 <a:cs typeface="Arial" panose="020B0604020202020204" pitchFamily="34" charset="0"/>
               </a:rPr>
-              <a:t>Publications</a:t>
+              <a:t>Awards</a:t>
             </a:r>
             <a:endParaRPr lang="zh-CN" altLang="en-US" b="1" dirty="0">
               <a:latin typeface="Arial" panose="020B0604020202020204" pitchFamily="34" charset="0"/>
@@ -5427,7 +5352,7 @@
         <p:spPr>
           <a:xfrm>
             <a:off x="992221" y="1258242"/>
-            <a:ext cx="10798790" cy="4940327"/>
+            <a:ext cx="10798790" cy="2970557"/>
           </a:xfrm>
           <a:prstGeom prst="rect">
             <a:avLst/>
@@ -5440,292 +5365,78 @@
           </a:bodyPr>
           <a:lstStyle/>
           <a:p>
-            <a:pPr>
+            <a:pPr marL="342900" indent="-342900" algn="just">
               <a:lnSpc>
                 <a:spcPct val="200000"/>
               </a:lnSpc>
+              <a:buAutoNum type="arabicPeriod"/>
             </a:pPr>
             <a:r>
               <a:rPr lang="en-US" altLang="zh-CN" sz="1600" dirty="0">
                 <a:latin typeface="Arial" panose="020B0604020202020204" pitchFamily="34" charset="0"/>
                 <a:cs typeface="Arial" panose="020B0604020202020204" pitchFamily="34" charset="0"/>
               </a:rPr>
-              <a:t>《</a:t>
-            </a:r>
-            <a:r>
-              <a:rPr lang="zh-CN" altLang="en-US" sz="1600" dirty="0">
-                <a:latin typeface="Arial" panose="020B0604020202020204" pitchFamily="34" charset="0"/>
-                <a:cs typeface="Arial" panose="020B0604020202020204" pitchFamily="34" charset="0"/>
-              </a:rPr>
-              <a:t>基于深度学习的医学图像配准综述</a:t>
-            </a:r>
+              <a:t>National Scholarship (2017 ~ 2018) [Intellectual education: 1st, Comprehensive assessment: 1st]</a:t>
+            </a:r>
+          </a:p>
+          <a:p>
+            <a:pPr marL="342900" indent="-342900" algn="just">
+              <a:lnSpc>
+                <a:spcPct val="200000"/>
+              </a:lnSpc>
+              <a:buAutoNum type="arabicPeriod"/>
+            </a:pPr>
             <a:r>
               <a:rPr lang="en-US" altLang="zh-CN" sz="1600" dirty="0">
                 <a:latin typeface="Arial" panose="020B0604020202020204" pitchFamily="34" charset="0"/>
                 <a:cs typeface="Arial" panose="020B0604020202020204" pitchFamily="34" charset="0"/>
               </a:rPr>
-              <a:t>》 </a:t>
-            </a:r>
-          </a:p>
-          <a:p>
-            <a:pPr>
+              <a:t>The Second Prize Scholarship (2018 ~ 2019) [Intellectual education: 1st, Comprehensive assessment: 3st]</a:t>
+            </a:r>
+          </a:p>
+          <a:p>
+            <a:pPr marL="342900" indent="-342900" algn="just">
               <a:lnSpc>
                 <a:spcPct val="200000"/>
               </a:lnSpc>
+              <a:buAutoNum type="arabicPeriod"/>
             </a:pPr>
             <a:r>
               <a:rPr lang="en-US" altLang="zh-CN" sz="1600" dirty="0">
                 <a:latin typeface="Arial" panose="020B0604020202020204" pitchFamily="34" charset="0"/>
                 <a:cs typeface="Arial" panose="020B0604020202020204" pitchFamily="34" charset="0"/>
               </a:rPr>
-              <a:t>       p.s. [</a:t>
-            </a:r>
-            <a:r>
-              <a:rPr lang="en-US" altLang="zh-CN" sz="1600" b="1" dirty="0">
-                <a:solidFill>
-                  <a:srgbClr val="FF0000"/>
-                </a:solidFill>
-                <a:latin typeface="Arial" panose="020B0604020202020204" pitchFamily="34" charset="0"/>
-                <a:cs typeface="Arial" panose="020B0604020202020204" pitchFamily="34" charset="0"/>
-              </a:rPr>
-              <a:t>rejected</a:t>
-            </a:r>
+              <a:t>Cstro 16th Conference -- AI and Big Data Part -- ROI Segmentation Challenge -- Head and Neck OAR track -- Champion</a:t>
+            </a:r>
+          </a:p>
+          <a:p>
+            <a:pPr marL="342900" indent="-342900" algn="just">
+              <a:lnSpc>
+                <a:spcPct val="200000"/>
+              </a:lnSpc>
+              <a:buAutoNum type="arabicPeriod"/>
+            </a:pPr>
             <a:r>
               <a:rPr lang="en-US" altLang="zh-CN" sz="1600" dirty="0">
                 <a:latin typeface="Arial" panose="020B0604020202020204" pitchFamily="34" charset="0"/>
                 <a:cs typeface="Arial" panose="020B0604020202020204" pitchFamily="34" charset="0"/>
               </a:rPr>
-              <a:t>]</a:t>
-            </a:r>
-          </a:p>
-          <a:p>
-            <a:pPr>
+              <a:t>National College Students Mathematical Modeling Competition Provincial Third Prize</a:t>
+            </a:r>
+          </a:p>
+          <a:p>
+            <a:pPr marL="342900" indent="-342900" algn="just">
               <a:lnSpc>
                 <a:spcPct val="200000"/>
               </a:lnSpc>
+              <a:buAutoNum type="arabicPeriod"/>
             </a:pPr>
             <a:r>
               <a:rPr lang="en-US" altLang="zh-CN" sz="1600" dirty="0">
                 <a:latin typeface="Arial" panose="020B0604020202020204" pitchFamily="34" charset="0"/>
                 <a:cs typeface="Arial" panose="020B0604020202020204" pitchFamily="34" charset="0"/>
               </a:rPr>
-              <a:t>《Auto Segmentation of Pelvic OARs On MRI Multi-Sequence Using An Fused-Unet》</a:t>
-            </a:r>
-          </a:p>
-          <a:p>
-            <a:pPr>
-              <a:lnSpc>
-                <a:spcPct val="200000"/>
-              </a:lnSpc>
-            </a:pPr>
-            <a:r>
-              <a:rPr lang="en-US" altLang="zh-CN" sz="1600" dirty="0">
-                <a:latin typeface="Arial" panose="020B0604020202020204" pitchFamily="34" charset="0"/>
-                <a:cs typeface="Arial" panose="020B0604020202020204" pitchFamily="34" charset="0"/>
-              </a:rPr>
-              <a:t>       p.s. [</a:t>
-            </a:r>
-            <a:r>
-              <a:rPr lang="en-US" altLang="zh-CN" sz="1600" b="1" dirty="0">
-                <a:solidFill>
-                  <a:schemeClr val="accent6">
-                    <a:lumMod val="75000"/>
-                  </a:schemeClr>
-                </a:solidFill>
-                <a:latin typeface="Arial" panose="020B0604020202020204" pitchFamily="34" charset="0"/>
-                <a:cs typeface="Arial" panose="020B0604020202020204" pitchFamily="34" charset="0"/>
-              </a:rPr>
-              <a:t>received</a:t>
-            </a:r>
-            <a:r>
-              <a:rPr lang="en-US" altLang="zh-CN" sz="1600" dirty="0">
-                <a:latin typeface="Arial" panose="020B0604020202020204" pitchFamily="34" charset="0"/>
-                <a:cs typeface="Arial" panose="020B0604020202020204" pitchFamily="34" charset="0"/>
-              </a:rPr>
-              <a:t>] (AAPM 2020 </a:t>
-            </a:r>
-            <a:r>
-              <a:rPr lang="en-US" altLang="zh-CN" sz="1600" b="1" dirty="0">
-                <a:latin typeface="Arial" panose="020B0604020202020204" pitchFamily="34" charset="0"/>
-                <a:cs typeface="Arial" panose="020B0604020202020204" pitchFamily="34" charset="0"/>
-              </a:rPr>
-              <a:t>oral presentation </a:t>
-            </a:r>
-            <a:r>
-              <a:rPr lang="en-US" altLang="zh-CN" sz="1600" dirty="0">
-                <a:latin typeface="Arial" panose="020B0604020202020204" pitchFamily="34" charset="0"/>
-                <a:cs typeface="Arial" panose="020B0604020202020204" pitchFamily="34" charset="0"/>
-              </a:rPr>
-              <a:t>&amp; </a:t>
-            </a:r>
-            <a:r>
-              <a:rPr lang="en-US" altLang="zh-CN" sz="1600" b="1" dirty="0">
-                <a:latin typeface="Arial" panose="020B0604020202020204" pitchFamily="34" charset="0"/>
-                <a:cs typeface="Arial" panose="020B0604020202020204" pitchFamily="34" charset="0"/>
-              </a:rPr>
-              <a:t>BLUE RIBBON ePOSTER</a:t>
-            </a:r>
-            <a:r>
-              <a:rPr lang="en-US" altLang="zh-CN" sz="1600" dirty="0">
-                <a:latin typeface="Arial" panose="020B0604020202020204" pitchFamily="34" charset="0"/>
-                <a:cs typeface="Arial" panose="020B0604020202020204" pitchFamily="34" charset="0"/>
-              </a:rPr>
-              <a:t>)</a:t>
-            </a:r>
-          </a:p>
-          <a:p>
-            <a:pPr>
-              <a:lnSpc>
-                <a:spcPct val="200000"/>
-              </a:lnSpc>
-            </a:pPr>
-            <a:r>
-              <a:rPr lang="en-US" altLang="zh-CN" sz="1600" dirty="0">
-                <a:latin typeface="Arial" panose="020B0604020202020204" pitchFamily="34" charset="0"/>
-                <a:cs typeface="Arial" panose="020B0604020202020204" pitchFamily="34" charset="0"/>
-              </a:rPr>
-              <a:t>《A Novel Hybrid Network for H&amp;N Organs At Risk Segmentation》 </a:t>
-            </a:r>
-          </a:p>
-          <a:p>
-            <a:pPr>
-              <a:lnSpc>
-                <a:spcPct val="200000"/>
-              </a:lnSpc>
-            </a:pPr>
-            <a:r>
-              <a:rPr lang="en-US" altLang="zh-CN" sz="1600" dirty="0">
-                <a:latin typeface="Arial" panose="020B0604020202020204" pitchFamily="34" charset="0"/>
-                <a:cs typeface="Arial" panose="020B0604020202020204" pitchFamily="34" charset="0"/>
-              </a:rPr>
-              <a:t>       p.s. [</a:t>
-            </a:r>
-            <a:r>
-              <a:rPr lang="en-US" altLang="zh-CN" sz="1600" b="1" dirty="0">
-                <a:solidFill>
-                  <a:schemeClr val="accent6">
-                    <a:lumMod val="75000"/>
-                  </a:schemeClr>
-                </a:solidFill>
-                <a:latin typeface="Arial" panose="020B0604020202020204" pitchFamily="34" charset="0"/>
-                <a:cs typeface="Arial" panose="020B0604020202020204" pitchFamily="34" charset="0"/>
-              </a:rPr>
-              <a:t>received</a:t>
-            </a:r>
-            <a:r>
-              <a:rPr lang="en-US" altLang="zh-CN" sz="1600" dirty="0">
-                <a:latin typeface="Arial" panose="020B0604020202020204" pitchFamily="34" charset="0"/>
-                <a:cs typeface="Arial" panose="020B0604020202020204" pitchFamily="34" charset="0"/>
-              </a:rPr>
-              <a:t>] (ICBIP 2020 </a:t>
-            </a:r>
-            <a:r>
-              <a:rPr lang="en-US" altLang="zh-CN" sz="1600" b="1" dirty="0">
-                <a:latin typeface="Arial" panose="020B0604020202020204" pitchFamily="34" charset="0"/>
-                <a:cs typeface="Arial" panose="020B0604020202020204" pitchFamily="34" charset="0"/>
-              </a:rPr>
-              <a:t>oral presentation</a:t>
-            </a:r>
-            <a:r>
-              <a:rPr lang="en-US" altLang="zh-CN" sz="1600" dirty="0">
-                <a:latin typeface="Arial" panose="020B0604020202020204" pitchFamily="34" charset="0"/>
-                <a:cs typeface="Arial" panose="020B0604020202020204" pitchFamily="34" charset="0"/>
-              </a:rPr>
-              <a:t>) -- Corresponding SCI Under Review</a:t>
-            </a:r>
-          </a:p>
-          <a:p>
-            <a:pPr>
-              <a:lnSpc>
-                <a:spcPct val="200000"/>
-              </a:lnSpc>
-            </a:pPr>
-            <a:r>
-              <a:rPr lang="en-US" altLang="zh-CN" sz="1600" dirty="0">
-                <a:latin typeface="Arial" panose="020B0604020202020204" pitchFamily="34" charset="0"/>
-                <a:cs typeface="Arial" panose="020B0604020202020204" pitchFamily="34" charset="0"/>
-              </a:rPr>
-              <a:t>《Attention V-Net: A Residual U-Net with Attention Gate Block for Lung Organ At Risk Segmentation》 </a:t>
-            </a:r>
-          </a:p>
-          <a:p>
-            <a:pPr>
-              <a:lnSpc>
-                <a:spcPct val="200000"/>
-              </a:lnSpc>
-            </a:pPr>
-            <a:r>
-              <a:rPr lang="en-US" altLang="zh-CN" sz="1600" dirty="0">
-                <a:latin typeface="Arial" panose="020B0604020202020204" pitchFamily="34" charset="0"/>
-                <a:cs typeface="Arial" panose="020B0604020202020204" pitchFamily="34" charset="0"/>
-              </a:rPr>
-              <a:t>       p.s. [</a:t>
-            </a:r>
-            <a:r>
-              <a:rPr lang="en-US" altLang="zh-CN" sz="1600" b="1" dirty="0">
-                <a:solidFill>
-                  <a:schemeClr val="accent6">
-                    <a:lumMod val="75000"/>
-                  </a:schemeClr>
-                </a:solidFill>
-                <a:latin typeface="Arial" panose="020B0604020202020204" pitchFamily="34" charset="0"/>
-                <a:cs typeface="Arial" panose="020B0604020202020204" pitchFamily="34" charset="0"/>
-              </a:rPr>
-              <a:t>received</a:t>
-            </a:r>
-            <a:r>
-              <a:rPr lang="en-US" altLang="zh-CN" sz="1600" dirty="0">
-                <a:latin typeface="Arial" panose="020B0604020202020204" pitchFamily="34" charset="0"/>
-                <a:cs typeface="Arial" panose="020B0604020202020204" pitchFamily="34" charset="0"/>
-              </a:rPr>
-              <a:t>] (CSAE 2020) -- Corresponding SCI Under Review</a:t>
-            </a:r>
-          </a:p>
-          <a:p>
-            <a:pPr>
-              <a:lnSpc>
-                <a:spcPct val="200000"/>
-              </a:lnSpc>
-            </a:pPr>
-            <a:r>
-              <a:rPr lang="en-US" altLang="zh-CN" sz="1600" dirty="0">
-                <a:latin typeface="Arial" panose="020B0604020202020204" pitchFamily="34" charset="0"/>
-                <a:cs typeface="Arial" panose="020B0604020202020204" pitchFamily="34" charset="0"/>
-              </a:rPr>
-              <a:t>《ZigZag U-Net: Multi-stage medical segmentation network》 </a:t>
-            </a:r>
-          </a:p>
-          <a:p>
-            <a:pPr>
-              <a:lnSpc>
-                <a:spcPct val="200000"/>
-              </a:lnSpc>
-            </a:pPr>
-            <a:r>
-              <a:rPr lang="en-US" altLang="zh-CN" sz="1600" dirty="0">
-                <a:latin typeface="Arial" panose="020B0604020202020204" pitchFamily="34" charset="0"/>
-                <a:cs typeface="Arial" panose="020B0604020202020204" pitchFamily="34" charset="0"/>
-              </a:rPr>
-              <a:t>       p.s. [</a:t>
-            </a:r>
-            <a:r>
-              <a:rPr lang="en-US" altLang="zh-CN" sz="1600" b="1" dirty="0">
-                <a:solidFill>
-                  <a:schemeClr val="accent5">
-                    <a:lumMod val="75000"/>
-                  </a:schemeClr>
-                </a:solidFill>
-                <a:latin typeface="Arial" panose="020B0604020202020204" pitchFamily="34" charset="0"/>
-                <a:cs typeface="Arial" panose="020B0604020202020204" pitchFamily="34" charset="0"/>
-              </a:rPr>
-              <a:t>to be submitted</a:t>
-            </a:r>
-            <a:r>
-              <a:rPr lang="en-US" altLang="zh-CN" sz="1600" dirty="0">
-                <a:latin typeface="Arial" panose="020B0604020202020204" pitchFamily="34" charset="0"/>
-                <a:cs typeface="Arial" panose="020B0604020202020204" pitchFamily="34" charset="0"/>
-              </a:rPr>
-              <a:t>] (inspired by CB-Net)</a:t>
+              <a:t>Taidi Cup 8th Data Mining Challenge Second Prize</a:t>
             </a:r>
           </a:p>
         </p:txBody>
@@ -5733,7 +5444,7 @@
     </p:spTree>
     <p:extLst>
       <p:ext uri="{BB962C8B-B14F-4D97-AF65-F5344CB8AC3E}">
-        <p14:creationId xmlns:p14="http://schemas.microsoft.com/office/powerpoint/2010/main" val="3035732194"/>
+        <p14:creationId xmlns:p14="http://schemas.microsoft.com/office/powerpoint/2010/main" val="787618689"/>
       </p:ext>
     </p:extLst>
   </p:cSld>
@@ -5743,7 +5454,7 @@
 </p:sld>
 </file>
 
-<file path=ppt/slides/slide5.xml><?xml version="1.0" encoding="utf-8"?>
+<file path=ppt/slides/slide3.xml><?xml version="1.0" encoding="utf-8"?>
 <p:sld xmlns:a="http://schemas.openxmlformats.org/drawingml/2006/main" xmlns:r="http://schemas.openxmlformats.org/officeDocument/2006/relationships" xmlns:p="http://schemas.openxmlformats.org/presentationml/2006/main">
   <p:cSld>
     <p:spTree>
@@ -5874,7 +5585,7 @@
         <p:spPr>
           <a:xfrm>
             <a:off x="992221" y="669303"/>
-            <a:ext cx="2121093" cy="369332"/>
+            <a:ext cx="2646878" cy="369332"/>
           </a:xfrm>
           <a:prstGeom prst="rect">
             <a:avLst/>
@@ -5892,7 +5603,7 @@
                 <a:latin typeface="Arial" panose="020B0604020202020204" pitchFamily="34" charset="0"/>
                 <a:cs typeface="Arial" panose="020B0604020202020204" pitchFamily="34" charset="0"/>
               </a:rPr>
-              <a:t>Research Interest</a:t>
+              <a:t>Research Experiences</a:t>
             </a:r>
             <a:endParaRPr lang="zh-CN" altLang="en-US" b="1" dirty="0">
               <a:latin typeface="Arial" panose="020B0604020202020204" pitchFamily="34" charset="0"/>
@@ -5916,7 +5627,7 @@
         <p:spPr>
           <a:xfrm>
             <a:off x="992221" y="1258242"/>
-            <a:ext cx="10798790" cy="2534027"/>
+            <a:ext cx="10798790" cy="4968027"/>
           </a:xfrm>
           <a:prstGeom prst="rect">
             <a:avLst/>
@@ -5929,6 +5640,63 @@
           </a:bodyPr>
           <a:lstStyle/>
           <a:p>
+            <a:pPr marL="342900" indent="-342900" algn="just">
+              <a:lnSpc>
+                <a:spcPct val="200000"/>
+              </a:lnSpc>
+              <a:buAutoNum type="arabicPeriod"/>
+            </a:pPr>
+            <a:r>
+              <a:rPr lang="en-US" altLang="zh-CN" sz="1600" dirty="0">
+                <a:latin typeface="Arial" panose="020B0604020202020204" pitchFamily="34" charset="0"/>
+                <a:cs typeface="Arial" panose="020B0604020202020204" pitchFamily="34" charset="0"/>
+              </a:rPr>
+              <a:t>Multi-media Emotion Recognition (SRP project From 2019.6 to 2020.4)</a:t>
+            </a:r>
+          </a:p>
+          <a:p>
+            <a:pPr marL="342900" indent="-342900" algn="just">
+              <a:lnSpc>
+                <a:spcPct val="200000"/>
+              </a:lnSpc>
+              <a:buAutoNum type="arabicPeriod"/>
+            </a:pPr>
+            <a:r>
+              <a:rPr lang="en-US" altLang="zh-CN" sz="1600" dirty="0">
+                <a:latin typeface="Arial" panose="020B0604020202020204" pitchFamily="34" charset="0"/>
+                <a:cs typeface="Arial" panose="020B0604020202020204" pitchFamily="34" charset="0"/>
+              </a:rPr>
+              <a:t>Sun Yat-sen University Cancer Center Research Assistant (From 2019.8 to now)</a:t>
+            </a:r>
+          </a:p>
+          <a:p>
+            <a:pPr marL="342900" indent="-342900" algn="just">
+              <a:lnSpc>
+                <a:spcPct val="200000"/>
+              </a:lnSpc>
+              <a:buAutoNum type="arabicPeriod"/>
+            </a:pPr>
+            <a:r>
+              <a:rPr lang="en-US" altLang="zh-CN" sz="1600" dirty="0">
+                <a:latin typeface="Arial" panose="020B0604020202020204" pitchFamily="34" charset="0"/>
+                <a:cs typeface="Arial" panose="020B0604020202020204" pitchFamily="34" charset="0"/>
+              </a:rPr>
+              <a:t>SCUT-Robot lab Member of vision group (From 2019.9 to now) </a:t>
+            </a:r>
+          </a:p>
+          <a:p>
+            <a:pPr marL="342900" indent="-342900" algn="just">
+              <a:lnSpc>
+                <a:spcPct val="150000"/>
+              </a:lnSpc>
+              <a:buAutoNum type="arabicPeriod"/>
+            </a:pPr>
+            <a:endParaRPr lang="en-US" altLang="zh-CN" dirty="0">
+              <a:latin typeface="Arial" panose="020B0604020202020204" pitchFamily="34" charset="0"/>
+              <a:cs typeface="Arial" panose="020B0604020202020204" pitchFamily="34" charset="0"/>
+            </a:endParaRPr>
+          </a:p>
+          <a:p>
             <a:pPr algn="just">
               <a:lnSpc>
                 <a:spcPct val="150000"/>
@@ -5939,7 +5707,58 @@
                 <a:latin typeface="Arial" panose="020B0604020202020204" pitchFamily="34" charset="0"/>
                 <a:cs typeface="Arial" panose="020B0604020202020204" pitchFamily="34" charset="0"/>
               </a:rPr>
-              <a:t>        Because of my past research, I may be interested in medical image segmentation, object detection and object track. Actually, I’m not limited to specific computer vision tasks. I’m interested in computer vision tasks which are meaningful and practical. For instance, the tumors and organs at risk automatic contouring on MRI Multi-sequence. MRI Multi-sequence tumors and organs at risk manual contouring is really time consuming and clinical knowledge intensive. So, we use Multi-modality model to perform MRI Multi-sequence automatic contouring which largely reduce the contouring time. </a:t>
+              <a:t>Detailed:</a:t>
+            </a:r>
+          </a:p>
+          <a:p>
+            <a:pPr algn="just">
+              <a:lnSpc>
+                <a:spcPct val="120000"/>
+              </a:lnSpc>
+              <a:spcAft>
+                <a:spcPts val="600"/>
+              </a:spcAft>
+            </a:pPr>
+            <a:r>
+              <a:rPr lang="en-US" altLang="zh-CN" sz="1600" dirty="0">
+                <a:latin typeface="Arial" panose="020B0604020202020204" pitchFamily="34" charset="0"/>
+                <a:cs typeface="Arial" panose="020B0604020202020204" pitchFamily="34" charset="0"/>
+              </a:rPr>
+              <a:t>1. In this project, I’m mainly in charge of implementation. We try to use neural network to extract the emotion feature representation from Multi-media data like image, video etc. Then we use regression and classification model to model the emotion state.</a:t>
+            </a:r>
+          </a:p>
+          <a:p>
+            <a:pPr algn="just">
+              <a:lnSpc>
+                <a:spcPct val="120000"/>
+              </a:lnSpc>
+              <a:spcAft>
+                <a:spcPts val="600"/>
+              </a:spcAft>
+            </a:pPr>
+            <a:r>
+              <a:rPr lang="en-US" altLang="zh-CN" sz="1600" dirty="0">
+                <a:latin typeface="Arial" panose="020B0604020202020204" pitchFamily="34" charset="0"/>
+                <a:cs typeface="Arial" panose="020B0604020202020204" pitchFamily="34" charset="0"/>
+              </a:rPr>
+              <a:t>2. I’m the research assistant of MIACA research group Sun Yat-sen University Cancer Center. I focus on medical image segmentation especially multi-modality medical image segmentation. Besides, I am also interested in medical image registration and medical image generation.</a:t>
+            </a:r>
+          </a:p>
+          <a:p>
+            <a:pPr algn="just">
+              <a:lnSpc>
+                <a:spcPct val="120000"/>
+              </a:lnSpc>
+              <a:spcAft>
+                <a:spcPts val="600"/>
+              </a:spcAft>
+            </a:pPr>
+            <a:r>
+              <a:rPr lang="en-US" altLang="zh-CN" sz="1600" dirty="0">
+                <a:latin typeface="Arial" panose="020B0604020202020204" pitchFamily="34" charset="0"/>
+                <a:cs typeface="Arial" panose="020B0604020202020204" pitchFamily="34" charset="0"/>
+              </a:rPr>
+              <a:t>3. I’m a member of Vision Group. I’m mainly in charge of base station. Base station can use object detection, object track and motion forecasting to strategy calculation so that it can provide some strategy support for other robots.</a:t>
             </a:r>
           </a:p>
         </p:txBody>
@@ -5947,7 +5766,7 @@
     </p:spTree>
     <p:extLst>
       <p:ext uri="{BB962C8B-B14F-4D97-AF65-F5344CB8AC3E}">
-        <p14:creationId xmlns:p14="http://schemas.microsoft.com/office/powerpoint/2010/main" val="2632657561"/>
+        <p14:creationId xmlns:p14="http://schemas.microsoft.com/office/powerpoint/2010/main" val="2830355095"/>
       </p:ext>
     </p:extLst>
   </p:cSld>
@@ -5957,7 +5776,7 @@
 </p:sld>
 </file>
 
-<file path=ppt/slides/slide6.xml><?xml version="1.0" encoding="utf-8"?>
+<file path=ppt/slides/slide4.xml><?xml version="1.0" encoding="utf-8"?>
 <p:sld xmlns:a="http://schemas.openxmlformats.org/drawingml/2006/main" xmlns:r="http://schemas.openxmlformats.org/officeDocument/2006/relationships" xmlns:p="http://schemas.openxmlformats.org/presentationml/2006/main">
   <p:cSld>
     <p:spTree>
@@ -6088,7 +5907,7 @@
         <p:spPr>
           <a:xfrm>
             <a:off x="992221" y="669303"/>
-            <a:ext cx="3788281" cy="369332"/>
+            <a:ext cx="1556836" cy="369332"/>
           </a:xfrm>
           <a:prstGeom prst="rect">
             <a:avLst/>
@@ -6106,7 +5925,7 @@
                 <a:latin typeface="Arial" panose="020B0604020202020204" pitchFamily="34" charset="0"/>
                 <a:cs typeface="Arial" panose="020B0604020202020204" pitchFamily="34" charset="0"/>
               </a:rPr>
-              <a:t>The implementation of VectorNet</a:t>
+              <a:t>Publications</a:t>
             </a:r>
             <a:endParaRPr lang="zh-CN" altLang="en-US" b="1" dirty="0">
               <a:latin typeface="Arial" panose="020B0604020202020204" pitchFamily="34" charset="0"/>
@@ -6130,7 +5949,7 @@
         <p:spPr>
           <a:xfrm>
             <a:off x="992221" y="1258242"/>
-            <a:ext cx="10428051" cy="1545295"/>
+            <a:ext cx="10798790" cy="4940327"/>
           </a:xfrm>
           <a:prstGeom prst="rect">
             <a:avLst/>
@@ -6143,128 +5962,300 @@
           </a:bodyPr>
           <a:lstStyle/>
           <a:p>
-            <a:pPr marL="342900" indent="-342900" algn="just">
+            <a:pPr>
               <a:lnSpc>
                 <a:spcPct val="200000"/>
               </a:lnSpc>
-              <a:buAutoNum type="arabicPeriod"/>
             </a:pPr>
             <a:r>
               <a:rPr lang="en-US" altLang="zh-CN" sz="1600" dirty="0">
                 <a:latin typeface="Arial" panose="020B0604020202020204" pitchFamily="34" charset="0"/>
                 <a:cs typeface="Arial" panose="020B0604020202020204" pitchFamily="34" charset="0"/>
               </a:rPr>
-              <a:t>Representing trajectories and maps</a:t>
-            </a:r>
-          </a:p>
-          <a:p>
-            <a:pPr marL="342900" indent="-342900" algn="just">
-              <a:lnSpc>
-                <a:spcPct val="200000"/>
-              </a:lnSpc>
-              <a:buAutoNum type="arabicPeriod"/>
-            </a:pPr>
+              <a:t>《</a:t>
+            </a:r>
+            <a:r>
+              <a:rPr lang="zh-CN" altLang="en-US" sz="1600" dirty="0">
+                <a:latin typeface="Arial" panose="020B0604020202020204" pitchFamily="34" charset="0"/>
+                <a:cs typeface="Arial" panose="020B0604020202020204" pitchFamily="34" charset="0"/>
+              </a:rPr>
+              <a:t>基于深度学习的医学图像配准综述</a:t>
+            </a:r>
             <a:r>
               <a:rPr lang="en-US" altLang="zh-CN" sz="1600" dirty="0">
                 <a:latin typeface="Arial" panose="020B0604020202020204" pitchFamily="34" charset="0"/>
                 <a:cs typeface="Arial" panose="020B0604020202020204" pitchFamily="34" charset="0"/>
               </a:rPr>
-              <a:t>Constructing the polyline subgraphs</a:t>
-            </a:r>
-          </a:p>
-          <a:p>
-            <a:pPr marL="342900" indent="-342900" algn="just">
+              <a:t>》 </a:t>
+            </a:r>
+          </a:p>
+          <a:p>
+            <a:pPr>
               <a:lnSpc>
                 <a:spcPct val="200000"/>
               </a:lnSpc>
-              <a:buAutoNum type="arabicPeriod"/>
             </a:pPr>
             <a:r>
               <a:rPr lang="en-US" altLang="zh-CN" sz="1600" dirty="0">
                 <a:latin typeface="Arial" panose="020B0604020202020204" pitchFamily="34" charset="0"/>
                 <a:cs typeface="Arial" panose="020B0604020202020204" pitchFamily="34" charset="0"/>
               </a:rPr>
-              <a:t>Global graph for high-order interactions</a:t>
-            </a:r>
-          </a:p>
-        </p:txBody>
-      </p:sp>
-      <p:pic>
-        <p:nvPicPr>
-          <p:cNvPr id="2" name="图片 1">
-            <a:extLst>
-              <a:ext uri="{FF2B5EF4-FFF2-40B4-BE49-F238E27FC236}">
-                <a16:creationId xmlns:a16="http://schemas.microsoft.com/office/drawing/2014/main" id="{1CAE9600-A1F7-481A-9535-70A09912EBA5}"/>
-              </a:ext>
-            </a:extLst>
-          </p:cNvPr>
-          <p:cNvPicPr>
-            <a:picLocks noChangeAspect="1"/>
-          </p:cNvPicPr>
-          <p:nvPr/>
-        </p:nvPicPr>
-        <p:blipFill>
-          <a:blip r:embed="rId2"/>
-          <a:stretch>
-            <a:fillRect/>
-          </a:stretch>
-        </p:blipFill>
-        <p:spPr>
-          <a:xfrm>
-            <a:off x="1915527" y="3146254"/>
-            <a:ext cx="7757832" cy="2598645"/>
-          </a:xfrm>
-          <a:prstGeom prst="rect">
-            <a:avLst/>
-          </a:prstGeom>
-        </p:spPr>
-      </p:pic>
-      <p:sp>
-        <p:nvSpPr>
-          <p:cNvPr id="3" name="文本框 2">
-            <a:extLst>
-              <a:ext uri="{FF2B5EF4-FFF2-40B4-BE49-F238E27FC236}">
-                <a16:creationId xmlns:a16="http://schemas.microsoft.com/office/drawing/2014/main" id="{8DF647A1-4A05-4C3B-9587-9B2486A5B3F2}"/>
-              </a:ext>
-            </a:extLst>
-          </p:cNvPr>
-          <p:cNvSpPr txBox="1"/>
-          <p:nvPr/>
-        </p:nvSpPr>
-        <p:spPr>
-          <a:xfrm>
-            <a:off x="3967789" y="5880920"/>
-            <a:ext cx="3653308" cy="307777"/>
-          </a:xfrm>
-          <a:prstGeom prst="rect">
-            <a:avLst/>
-          </a:prstGeom>
-          <a:noFill/>
-        </p:spPr>
-        <p:txBody>
-          <a:bodyPr wrap="none" rtlCol="0">
-            <a:spAutoFit/>
-          </a:bodyPr>
-          <a:lstStyle/>
-          <a:p>
-            <a:r>
-              <a:rPr lang="en-US" altLang="zh-CN" sz="1400" b="1" dirty="0">
+              <a:t>       p.s. [</a:t>
+            </a:r>
+            <a:r>
+              <a:rPr lang="en-US" altLang="zh-CN" sz="1600" b="1" dirty="0">
+                <a:solidFill>
+                  <a:srgbClr val="FF0000"/>
+                </a:solidFill>
                 <a:latin typeface="Arial" panose="020B0604020202020204" pitchFamily="34" charset="0"/>
                 <a:cs typeface="Arial" panose="020B0604020202020204" pitchFamily="34" charset="0"/>
               </a:rPr>
-              <a:t>Figure 1. The total workflow of VectorNet</a:t>
-            </a:r>
-            <a:endParaRPr lang="zh-CN" altLang="en-US" sz="1400" b="1" dirty="0">
-              <a:latin typeface="Arial" panose="020B0604020202020204" pitchFamily="34" charset="0"/>
-              <a:cs typeface="Arial" panose="020B0604020202020204" pitchFamily="34" charset="0"/>
-            </a:endParaRPr>
+              <a:t>rejected</a:t>
+            </a:r>
+            <a:r>
+              <a:rPr lang="en-US" altLang="zh-CN" sz="1600" dirty="0">
+                <a:latin typeface="Arial" panose="020B0604020202020204" pitchFamily="34" charset="0"/>
+                <a:cs typeface="Arial" panose="020B0604020202020204" pitchFamily="34" charset="0"/>
+              </a:rPr>
+              <a:t>]</a:t>
+            </a:r>
+          </a:p>
+          <a:p>
+            <a:pPr>
+              <a:lnSpc>
+                <a:spcPct val="200000"/>
+              </a:lnSpc>
+            </a:pPr>
+            <a:r>
+              <a:rPr lang="en-US" altLang="zh-CN" sz="1600" dirty="0">
+                <a:latin typeface="Arial" panose="020B0604020202020204" pitchFamily="34" charset="0"/>
+                <a:cs typeface="Arial" panose="020B0604020202020204" pitchFamily="34" charset="0"/>
+              </a:rPr>
+              <a:t>《Auto Segmentation of Pelvic OARs On MRI Multi-Sequence Using An Fused-Unet》</a:t>
+            </a:r>
+          </a:p>
+          <a:p>
+            <a:pPr>
+              <a:lnSpc>
+                <a:spcPct val="200000"/>
+              </a:lnSpc>
+            </a:pPr>
+            <a:r>
+              <a:rPr lang="en-US" altLang="zh-CN" sz="1600" dirty="0">
+                <a:latin typeface="Arial" panose="020B0604020202020204" pitchFamily="34" charset="0"/>
+                <a:cs typeface="Arial" panose="020B0604020202020204" pitchFamily="34" charset="0"/>
+              </a:rPr>
+              <a:t>       p.s. [</a:t>
+            </a:r>
+            <a:r>
+              <a:rPr lang="en-US" altLang="zh-CN" sz="1600" b="1" dirty="0">
+                <a:solidFill>
+                  <a:schemeClr val="accent6">
+                    <a:lumMod val="75000"/>
+                  </a:schemeClr>
+                </a:solidFill>
+                <a:latin typeface="Arial" panose="020B0604020202020204" pitchFamily="34" charset="0"/>
+                <a:cs typeface="Arial" panose="020B0604020202020204" pitchFamily="34" charset="0"/>
+              </a:rPr>
+              <a:t>received</a:t>
+            </a:r>
+            <a:r>
+              <a:rPr lang="en-US" altLang="zh-CN" sz="1600" dirty="0">
+                <a:latin typeface="Arial" panose="020B0604020202020204" pitchFamily="34" charset="0"/>
+                <a:cs typeface="Arial" panose="020B0604020202020204" pitchFamily="34" charset="0"/>
+              </a:rPr>
+              <a:t>] (AAPM 2020 </a:t>
+            </a:r>
+            <a:r>
+              <a:rPr lang="en-US" altLang="zh-CN" sz="1600" b="1" dirty="0">
+                <a:latin typeface="Arial" panose="020B0604020202020204" pitchFamily="34" charset="0"/>
+                <a:cs typeface="Arial" panose="020B0604020202020204" pitchFamily="34" charset="0"/>
+              </a:rPr>
+              <a:t>oral presentation </a:t>
+            </a:r>
+            <a:r>
+              <a:rPr lang="en-US" altLang="zh-CN" sz="1600" dirty="0">
+                <a:latin typeface="Arial" panose="020B0604020202020204" pitchFamily="34" charset="0"/>
+                <a:cs typeface="Arial" panose="020B0604020202020204" pitchFamily="34" charset="0"/>
+              </a:rPr>
+              <a:t>&amp; </a:t>
+            </a:r>
+            <a:r>
+              <a:rPr lang="en-US" altLang="zh-CN" sz="1600" b="1" dirty="0">
+                <a:latin typeface="Arial" panose="020B0604020202020204" pitchFamily="34" charset="0"/>
+                <a:cs typeface="Arial" panose="020B0604020202020204" pitchFamily="34" charset="0"/>
+              </a:rPr>
+              <a:t>BLUE RIBBON ePOSTER</a:t>
+            </a:r>
+            <a:r>
+              <a:rPr lang="en-US" altLang="zh-CN" sz="1600" dirty="0">
+                <a:latin typeface="Arial" panose="020B0604020202020204" pitchFamily="34" charset="0"/>
+                <a:cs typeface="Arial" panose="020B0604020202020204" pitchFamily="34" charset="0"/>
+              </a:rPr>
+              <a:t>)</a:t>
+            </a:r>
+          </a:p>
+          <a:p>
+            <a:pPr>
+              <a:lnSpc>
+                <a:spcPct val="200000"/>
+              </a:lnSpc>
+            </a:pPr>
+            <a:r>
+              <a:rPr lang="en-US" altLang="zh-CN" sz="1600" dirty="0">
+                <a:latin typeface="Arial" panose="020B0604020202020204" pitchFamily="34" charset="0"/>
+                <a:cs typeface="Arial" panose="020B0604020202020204" pitchFamily="34" charset="0"/>
+              </a:rPr>
+              <a:t>《A Novel Hybrid Network for H&amp;N Organs At Risk Segmentation》 </a:t>
+            </a:r>
+          </a:p>
+          <a:p>
+            <a:pPr>
+              <a:lnSpc>
+                <a:spcPct val="200000"/>
+              </a:lnSpc>
+            </a:pPr>
+            <a:r>
+              <a:rPr lang="en-US" altLang="zh-CN" sz="1600" dirty="0">
+                <a:latin typeface="Arial" panose="020B0604020202020204" pitchFamily="34" charset="0"/>
+                <a:cs typeface="Arial" panose="020B0604020202020204" pitchFamily="34" charset="0"/>
+              </a:rPr>
+              <a:t>       p.s. [</a:t>
+            </a:r>
+            <a:r>
+              <a:rPr lang="en-US" altLang="zh-CN" sz="1600" b="1" dirty="0">
+                <a:solidFill>
+                  <a:schemeClr val="accent6">
+                    <a:lumMod val="75000"/>
+                  </a:schemeClr>
+                </a:solidFill>
+                <a:latin typeface="Arial" panose="020B0604020202020204" pitchFamily="34" charset="0"/>
+                <a:cs typeface="Arial" panose="020B0604020202020204" pitchFamily="34" charset="0"/>
+              </a:rPr>
+              <a:t>received</a:t>
+            </a:r>
+            <a:r>
+              <a:rPr lang="en-US" altLang="zh-CN" sz="1600" dirty="0">
+                <a:latin typeface="Arial" panose="020B0604020202020204" pitchFamily="34" charset="0"/>
+                <a:cs typeface="Arial" panose="020B0604020202020204" pitchFamily="34" charset="0"/>
+              </a:rPr>
+              <a:t>] (ICBIP 2020 </a:t>
+            </a:r>
+            <a:r>
+              <a:rPr lang="en-US" altLang="zh-CN" sz="1600" b="1" dirty="0">
+                <a:latin typeface="Arial" panose="020B0604020202020204" pitchFamily="34" charset="0"/>
+                <a:cs typeface="Arial" panose="020B0604020202020204" pitchFamily="34" charset="0"/>
+              </a:rPr>
+              <a:t>oral presentation</a:t>
+            </a:r>
+            <a:r>
+              <a:rPr lang="en-US" altLang="zh-CN" sz="1600" dirty="0">
+                <a:latin typeface="Arial" panose="020B0604020202020204" pitchFamily="34" charset="0"/>
+                <a:cs typeface="Arial" panose="020B0604020202020204" pitchFamily="34" charset="0"/>
+              </a:rPr>
+              <a:t>) -- Corresponding SCI Under Review</a:t>
+            </a:r>
+          </a:p>
+          <a:p>
+            <a:pPr>
+              <a:lnSpc>
+                <a:spcPct val="200000"/>
+              </a:lnSpc>
+            </a:pPr>
+            <a:r>
+              <a:rPr lang="en-US" altLang="zh-CN" sz="1600" dirty="0">
+                <a:latin typeface="Arial" panose="020B0604020202020204" pitchFamily="34" charset="0"/>
+                <a:cs typeface="Arial" panose="020B0604020202020204" pitchFamily="34" charset="0"/>
+              </a:rPr>
+              <a:t>《Attention V-Net: A Residual U-Net with Attention Gate Block for Lung Organ At Risk Segmentation》 </a:t>
+            </a:r>
+          </a:p>
+          <a:p>
+            <a:pPr>
+              <a:lnSpc>
+                <a:spcPct val="200000"/>
+              </a:lnSpc>
+            </a:pPr>
+            <a:r>
+              <a:rPr lang="en-US" altLang="zh-CN" sz="1600" dirty="0">
+                <a:latin typeface="Arial" panose="020B0604020202020204" pitchFamily="34" charset="0"/>
+                <a:cs typeface="Arial" panose="020B0604020202020204" pitchFamily="34" charset="0"/>
+              </a:rPr>
+              <a:t>       p.s. [</a:t>
+            </a:r>
+            <a:r>
+              <a:rPr lang="en-US" altLang="zh-CN" sz="1600" b="1" dirty="0">
+                <a:solidFill>
+                  <a:schemeClr val="accent6">
+                    <a:lumMod val="75000"/>
+                  </a:schemeClr>
+                </a:solidFill>
+                <a:latin typeface="Arial" panose="020B0604020202020204" pitchFamily="34" charset="0"/>
+                <a:cs typeface="Arial" panose="020B0604020202020204" pitchFamily="34" charset="0"/>
+              </a:rPr>
+              <a:t>received</a:t>
+            </a:r>
+            <a:r>
+              <a:rPr lang="en-US" altLang="zh-CN" sz="1600" dirty="0">
+                <a:latin typeface="Arial" panose="020B0604020202020204" pitchFamily="34" charset="0"/>
+                <a:cs typeface="Arial" panose="020B0604020202020204" pitchFamily="34" charset="0"/>
+              </a:rPr>
+              <a:t>] (CSAE 2020) -- Corresponding SCI Under Review</a:t>
+            </a:r>
+          </a:p>
+          <a:p>
+            <a:pPr>
+              <a:lnSpc>
+                <a:spcPct val="200000"/>
+              </a:lnSpc>
+            </a:pPr>
+            <a:r>
+              <a:rPr lang="en-US" altLang="zh-CN" sz="1600" dirty="0">
+                <a:latin typeface="Arial" panose="020B0604020202020204" pitchFamily="34" charset="0"/>
+                <a:cs typeface="Arial" panose="020B0604020202020204" pitchFamily="34" charset="0"/>
+              </a:rPr>
+              <a:t>《ZigZag U-Net: Multi-stage medical segmentation network》 </a:t>
+            </a:r>
+          </a:p>
+          <a:p>
+            <a:pPr>
+              <a:lnSpc>
+                <a:spcPct val="200000"/>
+              </a:lnSpc>
+            </a:pPr>
+            <a:r>
+              <a:rPr lang="en-US" altLang="zh-CN" sz="1600" dirty="0">
+                <a:latin typeface="Arial" panose="020B0604020202020204" pitchFamily="34" charset="0"/>
+                <a:cs typeface="Arial" panose="020B0604020202020204" pitchFamily="34" charset="0"/>
+              </a:rPr>
+              <a:t>       p.s. [</a:t>
+            </a:r>
+            <a:r>
+              <a:rPr lang="en-US" altLang="zh-CN" sz="1600" b="1" dirty="0">
+                <a:solidFill>
+                  <a:schemeClr val="accent5">
+                    <a:lumMod val="75000"/>
+                  </a:schemeClr>
+                </a:solidFill>
+                <a:latin typeface="Arial" panose="020B0604020202020204" pitchFamily="34" charset="0"/>
+                <a:cs typeface="Arial" panose="020B0604020202020204" pitchFamily="34" charset="0"/>
+              </a:rPr>
+              <a:t>to be submitted</a:t>
+            </a:r>
+            <a:r>
+              <a:rPr lang="en-US" altLang="zh-CN" sz="1600" dirty="0">
+                <a:latin typeface="Arial" panose="020B0604020202020204" pitchFamily="34" charset="0"/>
+                <a:cs typeface="Arial" panose="020B0604020202020204" pitchFamily="34" charset="0"/>
+              </a:rPr>
+              <a:t>] (inspired by CB-Net)</a:t>
+            </a:r>
           </a:p>
         </p:txBody>
       </p:sp>
     </p:spTree>
     <p:extLst>
       <p:ext uri="{BB962C8B-B14F-4D97-AF65-F5344CB8AC3E}">
-        <p14:creationId xmlns:p14="http://schemas.microsoft.com/office/powerpoint/2010/main" val="1251499563"/>
+        <p14:creationId xmlns:p14="http://schemas.microsoft.com/office/powerpoint/2010/main" val="3035732194"/>
       </p:ext>
     </p:extLst>
   </p:cSld>
@@ -6274,7 +6265,7 @@
 </p:sld>
 </file>
 
-<file path=ppt/slides/slide7.xml><?xml version="1.0" encoding="utf-8"?>
+<file path=ppt/slides/slide5.xml><?xml version="1.0" encoding="utf-8"?>
 <p:sld xmlns:a="http://schemas.openxmlformats.org/drawingml/2006/main" xmlns:r="http://schemas.openxmlformats.org/officeDocument/2006/relationships" xmlns:p="http://schemas.openxmlformats.org/presentationml/2006/main">
   <p:cSld>
     <p:spTree>
@@ -6405,7 +6396,7 @@
         <p:spPr>
           <a:xfrm>
             <a:off x="992221" y="669303"/>
-            <a:ext cx="4108817" cy="369332"/>
+            <a:ext cx="2121093" cy="369332"/>
           </a:xfrm>
           <a:prstGeom prst="rect">
             <a:avLst/>
@@ -6423,7 +6414,7 @@
                 <a:latin typeface="Arial" panose="020B0604020202020204" pitchFamily="34" charset="0"/>
                 <a:cs typeface="Arial" panose="020B0604020202020204" pitchFamily="34" charset="0"/>
               </a:rPr>
-              <a:t>Representing trajectories and maps</a:t>
+              <a:t>Research Interest</a:t>
             </a:r>
             <a:endParaRPr lang="zh-CN" altLang="en-US" b="1" dirty="0">
               <a:latin typeface="Arial" panose="020B0604020202020204" pitchFamily="34" charset="0"/>
@@ -6447,7 +6438,7 @@
         <p:spPr>
           <a:xfrm>
             <a:off x="992221" y="1258242"/>
-            <a:ext cx="10428051" cy="1154675"/>
+            <a:ext cx="10798790" cy="2534027"/>
           </a:xfrm>
           <a:prstGeom prst="rect">
             <a:avLst/>
@@ -6466,184 +6457,19 @@
               </a:lnSpc>
             </a:pPr>
             <a:r>
-              <a:rPr lang="en-US" altLang="zh-CN" sz="1600" dirty="0">
+              <a:rPr lang="en-US" altLang="zh-CN" dirty="0">
                 <a:latin typeface="Arial" panose="020B0604020202020204" pitchFamily="34" charset="0"/>
                 <a:cs typeface="Arial" panose="020B0604020202020204" pitchFamily="34" charset="0"/>
               </a:rPr>
-              <a:t>        There are only the agent trajectory and lane needed to represent according to the requirements. In order to represent lane better, I use average lane width to calculate lane two-side edge line. Besides, I split the trajectory into observed trajectory [0s, 2s) and future trajectory [2s, 5s). </a:t>
-            </a:r>
-          </a:p>
-        </p:txBody>
-      </p:sp>
-      <p:pic>
-        <p:nvPicPr>
-          <p:cNvPr id="3" name="图片 2">
-            <a:extLst>
-              <a:ext uri="{FF2B5EF4-FFF2-40B4-BE49-F238E27FC236}">
-                <a16:creationId xmlns:a16="http://schemas.microsoft.com/office/drawing/2014/main" id="{CC22A32B-AA3F-4AF9-A9AD-3133731D02A1}"/>
-              </a:ext>
-            </a:extLst>
-          </p:cNvPr>
-          <p:cNvPicPr>
-            <a:picLocks noChangeAspect="1"/>
-          </p:cNvPicPr>
-          <p:nvPr/>
-        </p:nvPicPr>
-        <p:blipFill rotWithShape="1">
-          <a:blip r:embed="rId2">
-            <a:extLst>
-              <a:ext uri="{28A0092B-C50C-407E-A947-70E740481C1C}">
-                <a14:useLocalDpi xmlns:a14="http://schemas.microsoft.com/office/drawing/2010/main" val="0"/>
-              </a:ext>
-            </a:extLst>
-          </a:blip>
-          <a:srcRect l="15115" t="12235" r="9311" b="13203"/>
-          <a:stretch/>
-        </p:blipFill>
-        <p:spPr>
-          <a:xfrm>
-            <a:off x="1206646" y="2451731"/>
-            <a:ext cx="4458864" cy="3849299"/>
-          </a:xfrm>
-          <a:prstGeom prst="rect">
-            <a:avLst/>
-          </a:prstGeom>
-        </p:spPr>
-      </p:pic>
-      <p:pic>
-        <p:nvPicPr>
-          <p:cNvPr id="8" name="图片 7">
-            <a:extLst>
-              <a:ext uri="{FF2B5EF4-FFF2-40B4-BE49-F238E27FC236}">
-                <a16:creationId xmlns:a16="http://schemas.microsoft.com/office/drawing/2014/main" id="{62CA7196-30C8-4E5E-98F7-4A39C97F5A59}"/>
-              </a:ext>
-            </a:extLst>
-          </p:cNvPr>
-          <p:cNvPicPr>
-            <a:picLocks noChangeAspect="1"/>
-          </p:cNvPicPr>
-          <p:nvPr/>
-        </p:nvPicPr>
-        <p:blipFill rotWithShape="1">
-          <a:blip r:embed="rId3">
-            <a:extLst>
-              <a:ext uri="{28A0092B-C50C-407E-A947-70E740481C1C}">
-                <a14:useLocalDpi xmlns:a14="http://schemas.microsoft.com/office/drawing/2010/main" val="0"/>
-              </a:ext>
-            </a:extLst>
-          </a:blip>
-          <a:srcRect l="15114" t="10922" r="8738" b="12985"/>
-          <a:stretch/>
-        </p:blipFill>
-        <p:spPr>
-          <a:xfrm>
-            <a:off x="6095999" y="2427027"/>
-            <a:ext cx="4458864" cy="3898706"/>
-          </a:xfrm>
-          <a:prstGeom prst="rect">
-            <a:avLst/>
-          </a:prstGeom>
-        </p:spPr>
-      </p:pic>
-      <p:sp>
-        <p:nvSpPr>
-          <p:cNvPr id="10" name="文本框 9">
-            <a:extLst>
-              <a:ext uri="{FF2B5EF4-FFF2-40B4-BE49-F238E27FC236}">
-                <a16:creationId xmlns:a16="http://schemas.microsoft.com/office/drawing/2014/main" id="{23974CE9-34E5-4450-BA8B-BF97B8F877F1}"/>
-              </a:ext>
-            </a:extLst>
-          </p:cNvPr>
-          <p:cNvSpPr txBox="1"/>
-          <p:nvPr/>
-        </p:nvSpPr>
-        <p:spPr>
-          <a:xfrm>
-            <a:off x="1371249" y="6325733"/>
-            <a:ext cx="4129657" cy="276999"/>
-          </a:xfrm>
-          <a:prstGeom prst="rect">
-            <a:avLst/>
-          </a:prstGeom>
-          <a:noFill/>
-        </p:spPr>
-        <p:txBody>
-          <a:bodyPr wrap="none" rtlCol="0">
-            <a:spAutoFit/>
-          </a:bodyPr>
-          <a:lstStyle/>
-          <a:p>
-            <a:r>
-              <a:rPr lang="en-US" altLang="zh-CN" sz="1200" b="1" dirty="0">
-                <a:latin typeface="Arial" panose="020B0604020202020204" pitchFamily="34" charset="0"/>
-                <a:cs typeface="Arial" panose="020B0604020202020204" pitchFamily="34" charset="0"/>
-              </a:rPr>
-              <a:t>Figure 1. lane centerline and edgeline representations</a:t>
-            </a:r>
-            <a:endParaRPr lang="zh-CN" altLang="en-US" sz="1200" b="1" dirty="0">
-              <a:latin typeface="Arial" panose="020B0604020202020204" pitchFamily="34" charset="0"/>
-              <a:cs typeface="Arial" panose="020B0604020202020204" pitchFamily="34" charset="0"/>
-            </a:endParaRPr>
-          </a:p>
-        </p:txBody>
-      </p:sp>
-      <p:sp>
-        <p:nvSpPr>
-          <p:cNvPr id="11" name="文本框 10">
-            <a:extLst>
-              <a:ext uri="{FF2B5EF4-FFF2-40B4-BE49-F238E27FC236}">
-                <a16:creationId xmlns:a16="http://schemas.microsoft.com/office/drawing/2014/main" id="{6AF40A3B-86E9-4540-8CAD-5A5F463FD615}"/>
-              </a:ext>
-            </a:extLst>
-          </p:cNvPr>
-          <p:cNvSpPr txBox="1"/>
-          <p:nvPr/>
-        </p:nvSpPr>
-        <p:spPr>
-          <a:xfrm>
-            <a:off x="6191770" y="6301030"/>
-            <a:ext cx="4267322" cy="461665"/>
-          </a:xfrm>
-          <a:prstGeom prst="rect">
-            <a:avLst/>
-          </a:prstGeom>
-          <a:noFill/>
-        </p:spPr>
-        <p:txBody>
-          <a:bodyPr wrap="none" rtlCol="0">
-            <a:spAutoFit/>
-          </a:bodyPr>
-          <a:lstStyle/>
-          <a:p>
-            <a:pPr algn="ctr"/>
-            <a:r>
-              <a:rPr lang="en-US" altLang="zh-CN" sz="1200" b="1" dirty="0">
-                <a:latin typeface="Arial" panose="020B0604020202020204" pitchFamily="34" charset="0"/>
-                <a:cs typeface="Arial" panose="020B0604020202020204" pitchFamily="34" charset="0"/>
-              </a:rPr>
-              <a:t>Figure 2. lane centerline and edgeline representations, </a:t>
-            </a:r>
-          </a:p>
-          <a:p>
-            <a:pPr algn="ctr"/>
-            <a:r>
-              <a:rPr lang="en-US" altLang="zh-CN" sz="1200" b="1" dirty="0">
-                <a:latin typeface="Arial" panose="020B0604020202020204" pitchFamily="34" charset="0"/>
-                <a:cs typeface="Arial" panose="020B0604020202020204" pitchFamily="34" charset="0"/>
-              </a:rPr>
-              <a:t>agent observed trajectory, agent future agent trajectory </a:t>
-            </a:r>
-            <a:endParaRPr lang="zh-CN" altLang="en-US" sz="1200" b="1" dirty="0">
-              <a:latin typeface="Arial" panose="020B0604020202020204" pitchFamily="34" charset="0"/>
-              <a:cs typeface="Arial" panose="020B0604020202020204" pitchFamily="34" charset="0"/>
-            </a:endParaRPr>
+              <a:t>        Because of my past research, I may be interested in medical image segmentation, object detection and object track. Actually, I’m not limited to specific computer vision tasks. I’m interested in computer vision tasks which are meaningful and practical. For instance, the tumors and organs at risk automatic contouring on MRI Multi-sequence. MRI Multi-sequence tumors and organs at risk manual contouring is really time consuming and clinical knowledge intensive. So, we use Multi-modality model to perform MRI Multi-sequence automatic contouring which largely reduce the contouring time. </a:t>
+            </a:r>
           </a:p>
         </p:txBody>
       </p:sp>
     </p:spTree>
     <p:extLst>
       <p:ext uri="{BB962C8B-B14F-4D97-AF65-F5344CB8AC3E}">
-        <p14:creationId xmlns:p14="http://schemas.microsoft.com/office/powerpoint/2010/main" val="472302188"/>
+        <p14:creationId xmlns:p14="http://schemas.microsoft.com/office/powerpoint/2010/main" val="2632657561"/>
       </p:ext>
     </p:extLst>
   </p:cSld>
@@ -6653,7 +6479,7 @@
 </p:sld>
 </file>
 
-<file path=ppt/slides/slide8.xml><?xml version="1.0" encoding="utf-8"?>
+<file path=ppt/slides/slide6.xml><?xml version="1.0" encoding="utf-8"?>
 <p:sld xmlns:a="http://schemas.openxmlformats.org/drawingml/2006/main" xmlns:r="http://schemas.openxmlformats.org/officeDocument/2006/relationships" xmlns:p="http://schemas.openxmlformats.org/presentationml/2006/main">
   <p:cSld>
     <p:spTree>
@@ -6670,42 +6496,6 @@
           <a:chExt cx="0" cy="0"/>
         </a:xfrm>
       </p:grpSpPr>
-      <p:pic>
-        <p:nvPicPr>
-          <p:cNvPr id="15" name="图片 14">
-            <a:extLst>
-              <a:ext uri="{FF2B5EF4-FFF2-40B4-BE49-F238E27FC236}">
-                <a16:creationId xmlns:a16="http://schemas.microsoft.com/office/drawing/2014/main" id="{133DA28E-B742-4CA9-8346-F15B2C20A945}"/>
-              </a:ext>
-            </a:extLst>
-          </p:cNvPr>
-          <p:cNvPicPr>
-            <a:picLocks noChangeAspect="1"/>
-          </p:cNvPicPr>
-          <p:nvPr/>
-        </p:nvPicPr>
-        <p:blipFill>
-          <a:blip r:embed="rId2">
-            <a:extLst>
-              <a:ext uri="{28A0092B-C50C-407E-A947-70E740481C1C}">
-                <a14:useLocalDpi xmlns:a14="http://schemas.microsoft.com/office/drawing/2010/main" val="0"/>
-              </a:ext>
-            </a:extLst>
-          </a:blip>
-          <a:stretch>
-            <a:fillRect/>
-          </a:stretch>
-        </p:blipFill>
-        <p:spPr>
-          <a:xfrm>
-            <a:off x="229362" y="2772697"/>
-            <a:ext cx="11733272" cy="2466000"/>
-          </a:xfrm>
-          <a:prstGeom prst="rect">
-            <a:avLst/>
-          </a:prstGeom>
-        </p:spPr>
-      </p:pic>
       <p:sp>
         <p:nvSpPr>
           <p:cNvPr id="4" name="矩形 3">
@@ -6820,7 +6610,7 @@
         <p:spPr>
           <a:xfrm>
             <a:off x="992221" y="669303"/>
-            <a:ext cx="4108817" cy="369332"/>
+            <a:ext cx="3788281" cy="369332"/>
           </a:xfrm>
           <a:prstGeom prst="rect">
             <a:avLst/>
@@ -6838,7 +6628,7 @@
                 <a:latin typeface="Arial" panose="020B0604020202020204" pitchFamily="34" charset="0"/>
                 <a:cs typeface="Arial" panose="020B0604020202020204" pitchFamily="34" charset="0"/>
               </a:rPr>
-              <a:t>Representing trajectories and maps</a:t>
+              <a:t>The implementation of VectorNet</a:t>
             </a:r>
             <a:endParaRPr lang="zh-CN" altLang="en-US" b="1" dirty="0">
               <a:latin typeface="Arial" panose="020B0604020202020204" pitchFamily="34" charset="0"/>
@@ -6862,7 +6652,7 @@
         <p:spPr>
           <a:xfrm>
             <a:off x="992221" y="1258242"/>
-            <a:ext cx="10428051" cy="1154675"/>
+            <a:ext cx="10428051" cy="1545295"/>
           </a:xfrm>
           <a:prstGeom prst="rect">
             <a:avLst/>
@@ -6875,27 +6665,88 @@
           </a:bodyPr>
           <a:lstStyle/>
           <a:p>
-            <a:pPr algn="just">
+            <a:pPr marL="342900" indent="-342900" algn="just">
               <a:lnSpc>
-                <a:spcPct val="150000"/>
+                <a:spcPct val="200000"/>
               </a:lnSpc>
+              <a:buAutoNum type="arabicPeriod"/>
             </a:pPr>
             <a:r>
               <a:rPr lang="en-US" altLang="zh-CN" sz="1600" dirty="0">
                 <a:latin typeface="Arial" panose="020B0604020202020204" pitchFamily="34" charset="0"/>
                 <a:cs typeface="Arial" panose="020B0604020202020204" pitchFamily="34" charset="0"/>
               </a:rPr>
-              <a:t>        Because all of the lanes and trajectories are represented by point sets initially. So, we need to incorporate neighboring two point to vectorize these points and construct vector sets. Then we keep vector sets and remove point sets. Because the future trajectory sample points are our predict target, so we keep them.</a:t>
-            </a:r>
-          </a:p>
-        </p:txBody>
-      </p:sp>
-      <p:sp>
-        <p:nvSpPr>
-          <p:cNvPr id="10" name="文本框 9">
-            <a:extLst>
-              <a:ext uri="{FF2B5EF4-FFF2-40B4-BE49-F238E27FC236}">
-                <a16:creationId xmlns:a16="http://schemas.microsoft.com/office/drawing/2014/main" id="{AC339B83-E3FC-4060-B702-715D9808DA26}"/>
+              <a:t>Representing trajectories and maps</a:t>
+            </a:r>
+          </a:p>
+          <a:p>
+            <a:pPr marL="342900" indent="-342900" algn="just">
+              <a:lnSpc>
+                <a:spcPct val="200000"/>
+              </a:lnSpc>
+              <a:buAutoNum type="arabicPeriod"/>
+            </a:pPr>
+            <a:r>
+              <a:rPr lang="en-US" altLang="zh-CN" sz="1600" dirty="0">
+                <a:latin typeface="Arial" panose="020B0604020202020204" pitchFamily="34" charset="0"/>
+                <a:cs typeface="Arial" panose="020B0604020202020204" pitchFamily="34" charset="0"/>
+              </a:rPr>
+              <a:t>Constructing the polyline subgraphs</a:t>
+            </a:r>
+          </a:p>
+          <a:p>
+            <a:pPr marL="342900" indent="-342900" algn="just">
+              <a:lnSpc>
+                <a:spcPct val="200000"/>
+              </a:lnSpc>
+              <a:buAutoNum type="arabicPeriod"/>
+            </a:pPr>
+            <a:r>
+              <a:rPr lang="en-US" altLang="zh-CN" sz="1600" dirty="0">
+                <a:latin typeface="Arial" panose="020B0604020202020204" pitchFamily="34" charset="0"/>
+                <a:cs typeface="Arial" panose="020B0604020202020204" pitchFamily="34" charset="0"/>
+              </a:rPr>
+              <a:t>Global graph for high-order interactions</a:t>
+            </a:r>
+          </a:p>
+        </p:txBody>
+      </p:sp>
+      <p:pic>
+        <p:nvPicPr>
+          <p:cNvPr id="2" name="图片 1">
+            <a:extLst>
+              <a:ext uri="{FF2B5EF4-FFF2-40B4-BE49-F238E27FC236}">
+                <a16:creationId xmlns:a16="http://schemas.microsoft.com/office/drawing/2014/main" id="{1CAE9600-A1F7-481A-9535-70A09912EBA5}"/>
+              </a:ext>
+            </a:extLst>
+          </p:cNvPr>
+          <p:cNvPicPr>
+            <a:picLocks noChangeAspect="1"/>
+          </p:cNvPicPr>
+          <p:nvPr/>
+        </p:nvPicPr>
+        <p:blipFill>
+          <a:blip r:embed="rId2"/>
+          <a:stretch>
+            <a:fillRect/>
+          </a:stretch>
+        </p:blipFill>
+        <p:spPr>
+          <a:xfrm>
+            <a:off x="1915527" y="3146254"/>
+            <a:ext cx="7757832" cy="2598645"/>
+          </a:xfrm>
+          <a:prstGeom prst="rect">
+            <a:avLst/>
+          </a:prstGeom>
+        </p:spPr>
+      </p:pic>
+      <p:sp>
+        <p:nvSpPr>
+          <p:cNvPr id="3" name="文本框 2">
+            <a:extLst>
+              <a:ext uri="{FF2B5EF4-FFF2-40B4-BE49-F238E27FC236}">
+                <a16:creationId xmlns:a16="http://schemas.microsoft.com/office/drawing/2014/main" id="{8DF647A1-4A05-4C3B-9587-9B2486A5B3F2}"/>
               </a:ext>
             </a:extLst>
           </p:cNvPr>
@@ -6904,8 +6755,8 @@
         </p:nvSpPr>
         <p:spPr>
           <a:xfrm>
-            <a:off x="4115328" y="5484425"/>
-            <a:ext cx="3961341" cy="461665"/>
+            <a:off x="3967789" y="5880920"/>
+            <a:ext cx="3653308" cy="307777"/>
           </a:xfrm>
           <a:prstGeom prst="rect">
             <a:avLst/>
@@ -6918,25 +6769,14 @@
           </a:bodyPr>
           <a:lstStyle/>
           <a:p>
-            <a:pPr algn="ctr"/>
-            <a:r>
-              <a:rPr lang="en-US" altLang="zh-CN" sz="1200" b="1" dirty="0">
+            <a:r>
+              <a:rPr lang="en-US" altLang="zh-CN" sz="1400" b="1" dirty="0">
                 <a:latin typeface="Arial" panose="020B0604020202020204" pitchFamily="34" charset="0"/>
                 <a:cs typeface="Arial" panose="020B0604020202020204" pitchFamily="34" charset="0"/>
               </a:rPr>
-              <a:t>Figure 3. The process of vectorization of agent and </a:t>
-            </a:r>
-          </a:p>
-          <a:p>
-            <a:pPr algn="ctr"/>
-            <a:r>
-              <a:rPr lang="en-US" altLang="zh-CN" sz="1200" b="1" dirty="0">
-                <a:latin typeface="Arial" panose="020B0604020202020204" pitchFamily="34" charset="0"/>
-                <a:cs typeface="Arial" panose="020B0604020202020204" pitchFamily="34" charset="0"/>
-              </a:rPr>
-              <a:t>observed trajectory sample points</a:t>
-            </a:r>
-            <a:endParaRPr lang="zh-CN" altLang="en-US" sz="1200" b="1" dirty="0">
+              <a:t>Figure 1. The total workflow of VectorNet</a:t>
+            </a:r>
+            <a:endParaRPr lang="zh-CN" altLang="en-US" sz="1400" b="1" dirty="0">
               <a:latin typeface="Arial" panose="020B0604020202020204" pitchFamily="34" charset="0"/>
               <a:cs typeface="Arial" panose="020B0604020202020204" pitchFamily="34" charset="0"/>
             </a:endParaRPr>
@@ -6946,7 +6786,7 @@
     </p:spTree>
     <p:extLst>
       <p:ext uri="{BB962C8B-B14F-4D97-AF65-F5344CB8AC3E}">
-        <p14:creationId xmlns:p14="http://schemas.microsoft.com/office/powerpoint/2010/main" val="1450827884"/>
+        <p14:creationId xmlns:p14="http://schemas.microsoft.com/office/powerpoint/2010/main" val="1251499563"/>
       </p:ext>
     </p:extLst>
   </p:cSld>
@@ -6956,7 +6796,7 @@
 </p:sld>
 </file>
 
-<file path=ppt/slides/slide9.xml><?xml version="1.0" encoding="utf-8"?>
+<file path=ppt/slides/slide7.xml><?xml version="1.0" encoding="utf-8"?>
 <p:sld xmlns:a="http://schemas.openxmlformats.org/drawingml/2006/main" xmlns:r="http://schemas.openxmlformats.org/officeDocument/2006/relationships" xmlns:p="http://schemas.openxmlformats.org/presentationml/2006/main">
   <p:cSld>
     <p:spTree>
@@ -7087,7 +6927,7 @@
         <p:spPr>
           <a:xfrm>
             <a:off x="992221" y="669303"/>
-            <a:ext cx="4339650" cy="369332"/>
+            <a:ext cx="4108817" cy="369332"/>
           </a:xfrm>
           <a:prstGeom prst="rect">
             <a:avLst/>
@@ -7105,7 +6945,7 @@
                 <a:latin typeface="Arial" panose="020B0604020202020204" pitchFamily="34" charset="0"/>
                 <a:cs typeface="Arial" panose="020B0604020202020204" pitchFamily="34" charset="0"/>
               </a:rPr>
-              <a:t>Constructing the polyline subgraphs  </a:t>
+              <a:t>Representing trajectories and maps</a:t>
             </a:r>
             <a:endParaRPr lang="zh-CN" altLang="en-US" b="1" dirty="0">
               <a:latin typeface="Arial" panose="020B0604020202020204" pitchFamily="34" charset="0"/>
@@ -7152,21 +6992,689 @@
                 <a:latin typeface="Arial" panose="020B0604020202020204" pitchFamily="34" charset="0"/>
                 <a:cs typeface="Arial" panose="020B0604020202020204" pitchFamily="34" charset="0"/>
               </a:rPr>
-              <a:t>        This stage is actually the </a:t>
-            </a:r>
-            <a:r>
-              <a:rPr lang="en-US" altLang="zh-CN" sz="1600">
+              <a:t>        There are only the agent trajectory and lane needed to represent according to the requirements. In order to represent lane better, I use average lane width to calculate lane two-side edge line. Besides, I split the trajectory into observed trajectory [0s, 2s) and future trajectory [2s, 5s). </a:t>
+            </a:r>
+          </a:p>
+        </p:txBody>
+      </p:sp>
+      <p:pic>
+        <p:nvPicPr>
+          <p:cNvPr id="3" name="图片 2">
+            <a:extLst>
+              <a:ext uri="{FF2B5EF4-FFF2-40B4-BE49-F238E27FC236}">
+                <a16:creationId xmlns:a16="http://schemas.microsoft.com/office/drawing/2014/main" id="{CC22A32B-AA3F-4AF9-A9AD-3133731D02A1}"/>
+              </a:ext>
+            </a:extLst>
+          </p:cNvPr>
+          <p:cNvPicPr>
+            <a:picLocks noChangeAspect="1"/>
+          </p:cNvPicPr>
+          <p:nvPr/>
+        </p:nvPicPr>
+        <p:blipFill rotWithShape="1">
+          <a:blip r:embed="rId2">
+            <a:extLst>
+              <a:ext uri="{28A0092B-C50C-407E-A947-70E740481C1C}">
+                <a14:useLocalDpi xmlns:a14="http://schemas.microsoft.com/office/drawing/2010/main" val="0"/>
+              </a:ext>
+            </a:extLst>
+          </a:blip>
+          <a:srcRect l="15115" t="12235" r="9311" b="13203"/>
+          <a:stretch/>
+        </p:blipFill>
+        <p:spPr>
+          <a:xfrm>
+            <a:off x="1206646" y="2451731"/>
+            <a:ext cx="4458864" cy="3849299"/>
+          </a:xfrm>
+          <a:prstGeom prst="rect">
+            <a:avLst/>
+          </a:prstGeom>
+        </p:spPr>
+      </p:pic>
+      <p:pic>
+        <p:nvPicPr>
+          <p:cNvPr id="8" name="图片 7">
+            <a:extLst>
+              <a:ext uri="{FF2B5EF4-FFF2-40B4-BE49-F238E27FC236}">
+                <a16:creationId xmlns:a16="http://schemas.microsoft.com/office/drawing/2014/main" id="{62CA7196-30C8-4E5E-98F7-4A39C97F5A59}"/>
+              </a:ext>
+            </a:extLst>
+          </p:cNvPr>
+          <p:cNvPicPr>
+            <a:picLocks noChangeAspect="1"/>
+          </p:cNvPicPr>
+          <p:nvPr/>
+        </p:nvPicPr>
+        <p:blipFill rotWithShape="1">
+          <a:blip r:embed="rId3">
+            <a:extLst>
+              <a:ext uri="{28A0092B-C50C-407E-A947-70E740481C1C}">
+                <a14:useLocalDpi xmlns:a14="http://schemas.microsoft.com/office/drawing/2010/main" val="0"/>
+              </a:ext>
+            </a:extLst>
+          </a:blip>
+          <a:srcRect l="15114" t="10922" r="8738" b="12985"/>
+          <a:stretch/>
+        </p:blipFill>
+        <p:spPr>
+          <a:xfrm>
+            <a:off x="6095999" y="2427027"/>
+            <a:ext cx="4458864" cy="3898706"/>
+          </a:xfrm>
+          <a:prstGeom prst="rect">
+            <a:avLst/>
+          </a:prstGeom>
+        </p:spPr>
+      </p:pic>
+      <p:sp>
+        <p:nvSpPr>
+          <p:cNvPr id="10" name="文本框 9">
+            <a:extLst>
+              <a:ext uri="{FF2B5EF4-FFF2-40B4-BE49-F238E27FC236}">
+                <a16:creationId xmlns:a16="http://schemas.microsoft.com/office/drawing/2014/main" id="{23974CE9-34E5-4450-BA8B-BF97B8F877F1}"/>
+              </a:ext>
+            </a:extLst>
+          </p:cNvPr>
+          <p:cNvSpPr txBox="1"/>
+          <p:nvPr/>
+        </p:nvSpPr>
+        <p:spPr>
+          <a:xfrm>
+            <a:off x="1371249" y="6325733"/>
+            <a:ext cx="4129657" cy="276999"/>
+          </a:xfrm>
+          <a:prstGeom prst="rect">
+            <a:avLst/>
+          </a:prstGeom>
+          <a:noFill/>
+        </p:spPr>
+        <p:txBody>
+          <a:bodyPr wrap="none" rtlCol="0">
+            <a:spAutoFit/>
+          </a:bodyPr>
+          <a:lstStyle/>
+          <a:p>
+            <a:r>
+              <a:rPr lang="en-US" altLang="zh-CN" sz="1200" b="1" dirty="0">
                 <a:latin typeface="Arial" panose="020B0604020202020204" pitchFamily="34" charset="0"/>
                 <a:cs typeface="Arial" panose="020B0604020202020204" pitchFamily="34" charset="0"/>
               </a:rPr>
-              <a:t>embedding stage. </a:t>
-            </a:r>
+              <a:t>Figure 1. lane centerline and edgeline representations</a:t>
+            </a:r>
+            <a:endParaRPr lang="zh-CN" altLang="en-US" sz="1200" b="1" dirty="0">
+              <a:latin typeface="Arial" panose="020B0604020202020204" pitchFamily="34" charset="0"/>
+              <a:cs typeface="Arial" panose="020B0604020202020204" pitchFamily="34" charset="0"/>
+            </a:endParaRPr>
+          </a:p>
+        </p:txBody>
+      </p:sp>
+      <p:sp>
+        <p:nvSpPr>
+          <p:cNvPr id="11" name="文本框 10">
+            <a:extLst>
+              <a:ext uri="{FF2B5EF4-FFF2-40B4-BE49-F238E27FC236}">
+                <a16:creationId xmlns:a16="http://schemas.microsoft.com/office/drawing/2014/main" id="{6AF40A3B-86E9-4540-8CAD-5A5F463FD615}"/>
+              </a:ext>
+            </a:extLst>
+          </p:cNvPr>
+          <p:cNvSpPr txBox="1"/>
+          <p:nvPr/>
+        </p:nvSpPr>
+        <p:spPr>
+          <a:xfrm>
+            <a:off x="6191770" y="6301030"/>
+            <a:ext cx="4267322" cy="461665"/>
+          </a:xfrm>
+          <a:prstGeom prst="rect">
+            <a:avLst/>
+          </a:prstGeom>
+          <a:noFill/>
+        </p:spPr>
+        <p:txBody>
+          <a:bodyPr wrap="none" rtlCol="0">
+            <a:spAutoFit/>
+          </a:bodyPr>
+          <a:lstStyle/>
+          <a:p>
+            <a:pPr algn="ctr"/>
+            <a:r>
+              <a:rPr lang="en-US" altLang="zh-CN" sz="1200" b="1" dirty="0">
+                <a:latin typeface="Arial" panose="020B0604020202020204" pitchFamily="34" charset="0"/>
+                <a:cs typeface="Arial" panose="020B0604020202020204" pitchFamily="34" charset="0"/>
+              </a:rPr>
+              <a:t>Figure 2. lane centerline and edgeline representations, </a:t>
+            </a:r>
+          </a:p>
+          <a:p>
+            <a:pPr algn="ctr"/>
+            <a:r>
+              <a:rPr lang="en-US" altLang="zh-CN" sz="1200" b="1" dirty="0">
+                <a:latin typeface="Arial" panose="020B0604020202020204" pitchFamily="34" charset="0"/>
+                <a:cs typeface="Arial" panose="020B0604020202020204" pitchFamily="34" charset="0"/>
+              </a:rPr>
+              <a:t>agent observed trajectory, agent future agent trajectory </a:t>
+            </a:r>
+            <a:endParaRPr lang="zh-CN" altLang="en-US" sz="1200" b="1" dirty="0">
+              <a:latin typeface="Arial" panose="020B0604020202020204" pitchFamily="34" charset="0"/>
+              <a:cs typeface="Arial" panose="020B0604020202020204" pitchFamily="34" charset="0"/>
+            </a:endParaRPr>
+          </a:p>
+        </p:txBody>
+      </p:sp>
+    </p:spTree>
+    <p:extLst>
+      <p:ext uri="{BB962C8B-B14F-4D97-AF65-F5344CB8AC3E}">
+        <p14:creationId xmlns:p14="http://schemas.microsoft.com/office/powerpoint/2010/main" val="472302188"/>
+      </p:ext>
+    </p:extLst>
+  </p:cSld>
+  <p:clrMapOvr>
+    <a:masterClrMapping/>
+  </p:clrMapOvr>
+</p:sld>
+</file>
+
+<file path=ppt/slides/slide8.xml><?xml version="1.0" encoding="utf-8"?>
+<p:sld xmlns:a="http://schemas.openxmlformats.org/drawingml/2006/main" xmlns:r="http://schemas.openxmlformats.org/officeDocument/2006/relationships" xmlns:p="http://schemas.openxmlformats.org/presentationml/2006/main">
+  <p:cSld>
+    <p:spTree>
+      <p:nvGrpSpPr>
+        <p:cNvPr id="1" name=""/>
+        <p:cNvGrpSpPr/>
+        <p:nvPr/>
+      </p:nvGrpSpPr>
+      <p:grpSpPr>
+        <a:xfrm>
+          <a:off x="0" y="0"/>
+          <a:ext cx="0" cy="0"/>
+          <a:chOff x="0" y="0"/>
+          <a:chExt cx="0" cy="0"/>
+        </a:xfrm>
+      </p:grpSpPr>
+      <p:pic>
+        <p:nvPicPr>
+          <p:cNvPr id="15" name="图片 14">
+            <a:extLst>
+              <a:ext uri="{FF2B5EF4-FFF2-40B4-BE49-F238E27FC236}">
+                <a16:creationId xmlns:a16="http://schemas.microsoft.com/office/drawing/2014/main" id="{133DA28E-B742-4CA9-8346-F15B2C20A945}"/>
+              </a:ext>
+            </a:extLst>
+          </p:cNvPr>
+          <p:cNvPicPr>
+            <a:picLocks noChangeAspect="1"/>
+          </p:cNvPicPr>
+          <p:nvPr/>
+        </p:nvPicPr>
+        <p:blipFill>
+          <a:blip r:embed="rId2">
+            <a:extLst>
+              <a:ext uri="{28A0092B-C50C-407E-A947-70E740481C1C}">
+                <a14:useLocalDpi xmlns:a14="http://schemas.microsoft.com/office/drawing/2010/main" val="0"/>
+              </a:ext>
+            </a:extLst>
+          </a:blip>
+          <a:stretch>
+            <a:fillRect/>
+          </a:stretch>
+        </p:blipFill>
+        <p:spPr>
+          <a:xfrm>
+            <a:off x="229362" y="2772697"/>
+            <a:ext cx="11733272" cy="2466000"/>
+          </a:xfrm>
+          <a:prstGeom prst="rect">
+            <a:avLst/>
+          </a:prstGeom>
+        </p:spPr>
+      </p:pic>
+      <p:sp>
+        <p:nvSpPr>
+          <p:cNvPr id="4" name="矩形 3">
+            <a:extLst>
+              <a:ext uri="{FF2B5EF4-FFF2-40B4-BE49-F238E27FC236}">
+                <a16:creationId xmlns:a16="http://schemas.microsoft.com/office/drawing/2014/main" id="{86CA40CB-69A5-4370-BB91-2BF9FD622FD5}"/>
+              </a:ext>
+            </a:extLst>
+          </p:cNvPr>
+          <p:cNvSpPr/>
+          <p:nvPr/>
+        </p:nvSpPr>
+        <p:spPr>
+          <a:xfrm>
+            <a:off x="603315" y="386499"/>
+            <a:ext cx="197963" cy="565608"/>
+          </a:xfrm>
+          <a:prstGeom prst="rect">
+            <a:avLst/>
+          </a:prstGeom>
+          <a:solidFill>
+            <a:schemeClr val="bg2">
+              <a:lumMod val="75000"/>
+            </a:schemeClr>
+          </a:solidFill>
+          <a:ln>
+            <a:noFill/>
+          </a:ln>
+        </p:spPr>
+        <p:style>
+          <a:lnRef idx="2">
+            <a:schemeClr val="accent1">
+              <a:shade val="50000"/>
+            </a:schemeClr>
+          </a:lnRef>
+          <a:fillRef idx="1">
+            <a:schemeClr val="accent1"/>
+          </a:fillRef>
+          <a:effectRef idx="0">
+            <a:schemeClr val="accent1"/>
+          </a:effectRef>
+          <a:fontRef idx="minor">
+            <a:schemeClr val="lt1"/>
+          </a:fontRef>
+        </p:style>
+        <p:txBody>
+          <a:bodyPr rtlCol="0" anchor="ctr"/>
+          <a:lstStyle/>
+          <a:p>
+            <a:pPr algn="ctr"/>
+            <a:endParaRPr lang="zh-CN" altLang="en-US"/>
+          </a:p>
+        </p:txBody>
+      </p:sp>
+      <p:cxnSp>
+        <p:nvCxnSpPr>
+          <p:cNvPr id="6" name="直接连接符 5">
+            <a:extLst>
+              <a:ext uri="{FF2B5EF4-FFF2-40B4-BE49-F238E27FC236}">
+                <a16:creationId xmlns:a16="http://schemas.microsoft.com/office/drawing/2014/main" id="{89D0ED6E-9637-4BA9-9E46-2653A77A44E3}"/>
+              </a:ext>
+            </a:extLst>
+          </p:cNvPr>
+          <p:cNvCxnSpPr/>
+          <p:nvPr/>
+        </p:nvCxnSpPr>
+        <p:spPr>
+          <a:xfrm>
+            <a:off x="920684" y="584762"/>
+            <a:ext cx="10350631" cy="0"/>
+          </a:xfrm>
+          <a:prstGeom prst="line">
+            <a:avLst/>
+          </a:prstGeom>
+          <a:ln>
+            <a:solidFill>
+              <a:schemeClr val="tx2">
+                <a:lumMod val="40000"/>
+                <a:lumOff val="60000"/>
+              </a:schemeClr>
+            </a:solidFill>
+            <a:prstDash val="dash"/>
+          </a:ln>
+        </p:spPr>
+        <p:style>
+          <a:lnRef idx="1">
+            <a:schemeClr val="accent1"/>
+          </a:lnRef>
+          <a:fillRef idx="0">
+            <a:schemeClr val="accent1"/>
+          </a:fillRef>
+          <a:effectRef idx="0">
+            <a:schemeClr val="accent1"/>
+          </a:effectRef>
+          <a:fontRef idx="minor">
+            <a:schemeClr val="tx1"/>
+          </a:fontRef>
+        </p:style>
+      </p:cxnSp>
+      <p:sp>
+        <p:nvSpPr>
+          <p:cNvPr id="7" name="文本框 6">
+            <a:extLst>
+              <a:ext uri="{FF2B5EF4-FFF2-40B4-BE49-F238E27FC236}">
+                <a16:creationId xmlns:a16="http://schemas.microsoft.com/office/drawing/2014/main" id="{FB657D43-34B0-4FC8-BE54-3C2BA4DDB72B}"/>
+              </a:ext>
+            </a:extLst>
+          </p:cNvPr>
+          <p:cNvSpPr txBox="1"/>
+          <p:nvPr/>
+        </p:nvSpPr>
+        <p:spPr>
+          <a:xfrm>
+            <a:off x="992221" y="669303"/>
+            <a:ext cx="4108817" cy="369332"/>
+          </a:xfrm>
+          <a:prstGeom prst="rect">
+            <a:avLst/>
+          </a:prstGeom>
+          <a:noFill/>
+        </p:spPr>
+        <p:txBody>
+          <a:bodyPr wrap="none" rtlCol="0">
+            <a:spAutoFit/>
+          </a:bodyPr>
+          <a:lstStyle/>
+          <a:p>
+            <a:r>
+              <a:rPr lang="en-US" altLang="zh-CN" b="1" dirty="0">
+                <a:latin typeface="Arial" panose="020B0604020202020204" pitchFamily="34" charset="0"/>
+                <a:cs typeface="Arial" panose="020B0604020202020204" pitchFamily="34" charset="0"/>
+              </a:rPr>
+              <a:t>Representing trajectories and maps</a:t>
+            </a:r>
+            <a:endParaRPr lang="zh-CN" altLang="en-US" b="1" dirty="0">
+              <a:latin typeface="Arial" panose="020B0604020202020204" pitchFamily="34" charset="0"/>
+              <a:cs typeface="Arial" panose="020B0604020202020204" pitchFamily="34" charset="0"/>
+            </a:endParaRPr>
+          </a:p>
+        </p:txBody>
+      </p:sp>
+      <p:sp>
+        <p:nvSpPr>
+          <p:cNvPr id="9" name="文本框 8">
+            <a:extLst>
+              <a:ext uri="{FF2B5EF4-FFF2-40B4-BE49-F238E27FC236}">
+                <a16:creationId xmlns:a16="http://schemas.microsoft.com/office/drawing/2014/main" id="{B829983B-D66B-4BAE-95AE-CD2D4EA6EF57}"/>
+              </a:ext>
+            </a:extLst>
+          </p:cNvPr>
+          <p:cNvSpPr txBox="1"/>
+          <p:nvPr/>
+        </p:nvSpPr>
+        <p:spPr>
+          <a:xfrm>
+            <a:off x="992221" y="1258242"/>
+            <a:ext cx="10428051" cy="1154675"/>
+          </a:xfrm>
+          <a:prstGeom prst="rect">
+            <a:avLst/>
+          </a:prstGeom>
+          <a:noFill/>
+        </p:spPr>
+        <p:txBody>
+          <a:bodyPr wrap="square" rtlCol="0">
+            <a:spAutoFit/>
+          </a:bodyPr>
+          <a:lstStyle/>
+          <a:p>
+            <a:pPr algn="just">
+              <a:lnSpc>
+                <a:spcPct val="150000"/>
+              </a:lnSpc>
+            </a:pPr>
             <a:r>
               <a:rPr lang="en-US" altLang="zh-CN" sz="1600" dirty="0">
                 <a:latin typeface="Arial" panose="020B0604020202020204" pitchFamily="34" charset="0"/>
                 <a:cs typeface="Arial" panose="020B0604020202020204" pitchFamily="34" charset="0"/>
               </a:rPr>
-              <a:t>According to the paper, one vector set represents a polyline. As stated before, one lane can be seen as a polyline and the observed trajectory can also be seen as a polyline. So, we will convert these vector sets to polyline level features by constructing the polyline subgraphs.</a:t>
+              <a:t>        Because all of the lanes and trajectories are represented by point sets initially. So, we need to incorporate neighboring two point to vectorize these points and construct vector sets. Then we keep vector sets and remove point sets. Because the future trajectory sample points are our predict target, so we keep them.</a:t>
+            </a:r>
+          </a:p>
+        </p:txBody>
+      </p:sp>
+      <p:sp>
+        <p:nvSpPr>
+          <p:cNvPr id="10" name="文本框 9">
+            <a:extLst>
+              <a:ext uri="{FF2B5EF4-FFF2-40B4-BE49-F238E27FC236}">
+                <a16:creationId xmlns:a16="http://schemas.microsoft.com/office/drawing/2014/main" id="{AC339B83-E3FC-4060-B702-715D9808DA26}"/>
+              </a:ext>
+            </a:extLst>
+          </p:cNvPr>
+          <p:cNvSpPr txBox="1"/>
+          <p:nvPr/>
+        </p:nvSpPr>
+        <p:spPr>
+          <a:xfrm>
+            <a:off x="4115328" y="5484425"/>
+            <a:ext cx="3961341" cy="461665"/>
+          </a:xfrm>
+          <a:prstGeom prst="rect">
+            <a:avLst/>
+          </a:prstGeom>
+          <a:noFill/>
+        </p:spPr>
+        <p:txBody>
+          <a:bodyPr wrap="none" rtlCol="0">
+            <a:spAutoFit/>
+          </a:bodyPr>
+          <a:lstStyle/>
+          <a:p>
+            <a:pPr algn="ctr"/>
+            <a:r>
+              <a:rPr lang="en-US" altLang="zh-CN" sz="1200" b="1" dirty="0">
+                <a:latin typeface="Arial" panose="020B0604020202020204" pitchFamily="34" charset="0"/>
+                <a:cs typeface="Arial" panose="020B0604020202020204" pitchFamily="34" charset="0"/>
+              </a:rPr>
+              <a:t>Figure 3. The process of vectorization of agent and </a:t>
+            </a:r>
+          </a:p>
+          <a:p>
+            <a:pPr algn="ctr"/>
+            <a:r>
+              <a:rPr lang="en-US" altLang="zh-CN" sz="1200" b="1" dirty="0">
+                <a:latin typeface="Arial" panose="020B0604020202020204" pitchFamily="34" charset="0"/>
+                <a:cs typeface="Arial" panose="020B0604020202020204" pitchFamily="34" charset="0"/>
+              </a:rPr>
+              <a:t>observed trajectory sample points</a:t>
+            </a:r>
+            <a:endParaRPr lang="zh-CN" altLang="en-US" sz="1200" b="1" dirty="0">
+              <a:latin typeface="Arial" panose="020B0604020202020204" pitchFamily="34" charset="0"/>
+              <a:cs typeface="Arial" panose="020B0604020202020204" pitchFamily="34" charset="0"/>
+            </a:endParaRPr>
+          </a:p>
+        </p:txBody>
+      </p:sp>
+    </p:spTree>
+    <p:extLst>
+      <p:ext uri="{BB962C8B-B14F-4D97-AF65-F5344CB8AC3E}">
+        <p14:creationId xmlns:p14="http://schemas.microsoft.com/office/powerpoint/2010/main" val="1450827884"/>
+      </p:ext>
+    </p:extLst>
+  </p:cSld>
+  <p:clrMapOvr>
+    <a:masterClrMapping/>
+  </p:clrMapOvr>
+</p:sld>
+</file>
+
+<file path=ppt/slides/slide9.xml><?xml version="1.0" encoding="utf-8"?>
+<p:sld xmlns:a="http://schemas.openxmlformats.org/drawingml/2006/main" xmlns:r="http://schemas.openxmlformats.org/officeDocument/2006/relationships" xmlns:p="http://schemas.openxmlformats.org/presentationml/2006/main">
+  <p:cSld>
+    <p:spTree>
+      <p:nvGrpSpPr>
+        <p:cNvPr id="1" name=""/>
+        <p:cNvGrpSpPr/>
+        <p:nvPr/>
+      </p:nvGrpSpPr>
+      <p:grpSpPr>
+        <a:xfrm>
+          <a:off x="0" y="0"/>
+          <a:ext cx="0" cy="0"/>
+          <a:chOff x="0" y="0"/>
+          <a:chExt cx="0" cy="0"/>
+        </a:xfrm>
+      </p:grpSpPr>
+      <p:sp>
+        <p:nvSpPr>
+          <p:cNvPr id="4" name="矩形 3">
+            <a:extLst>
+              <a:ext uri="{FF2B5EF4-FFF2-40B4-BE49-F238E27FC236}">
+                <a16:creationId xmlns:a16="http://schemas.microsoft.com/office/drawing/2014/main" id="{86CA40CB-69A5-4370-BB91-2BF9FD622FD5}"/>
+              </a:ext>
+            </a:extLst>
+          </p:cNvPr>
+          <p:cNvSpPr/>
+          <p:nvPr/>
+        </p:nvSpPr>
+        <p:spPr>
+          <a:xfrm>
+            <a:off x="603315" y="386499"/>
+            <a:ext cx="197963" cy="565608"/>
+          </a:xfrm>
+          <a:prstGeom prst="rect">
+            <a:avLst/>
+          </a:prstGeom>
+          <a:solidFill>
+            <a:schemeClr val="bg2">
+              <a:lumMod val="75000"/>
+            </a:schemeClr>
+          </a:solidFill>
+          <a:ln>
+            <a:noFill/>
+          </a:ln>
+        </p:spPr>
+        <p:style>
+          <a:lnRef idx="2">
+            <a:schemeClr val="accent1">
+              <a:shade val="50000"/>
+            </a:schemeClr>
+          </a:lnRef>
+          <a:fillRef idx="1">
+            <a:schemeClr val="accent1"/>
+          </a:fillRef>
+          <a:effectRef idx="0">
+            <a:schemeClr val="accent1"/>
+          </a:effectRef>
+          <a:fontRef idx="minor">
+            <a:schemeClr val="lt1"/>
+          </a:fontRef>
+        </p:style>
+        <p:txBody>
+          <a:bodyPr rtlCol="0" anchor="ctr"/>
+          <a:lstStyle/>
+          <a:p>
+            <a:pPr algn="ctr"/>
+            <a:endParaRPr lang="zh-CN" altLang="en-US"/>
+          </a:p>
+        </p:txBody>
+      </p:sp>
+      <p:cxnSp>
+        <p:nvCxnSpPr>
+          <p:cNvPr id="6" name="直接连接符 5">
+            <a:extLst>
+              <a:ext uri="{FF2B5EF4-FFF2-40B4-BE49-F238E27FC236}">
+                <a16:creationId xmlns:a16="http://schemas.microsoft.com/office/drawing/2014/main" id="{89D0ED6E-9637-4BA9-9E46-2653A77A44E3}"/>
+              </a:ext>
+            </a:extLst>
+          </p:cNvPr>
+          <p:cNvCxnSpPr/>
+          <p:nvPr/>
+        </p:nvCxnSpPr>
+        <p:spPr>
+          <a:xfrm>
+            <a:off x="920684" y="584762"/>
+            <a:ext cx="10350631" cy="0"/>
+          </a:xfrm>
+          <a:prstGeom prst="line">
+            <a:avLst/>
+          </a:prstGeom>
+          <a:ln>
+            <a:solidFill>
+              <a:schemeClr val="tx2">
+                <a:lumMod val="40000"/>
+                <a:lumOff val="60000"/>
+              </a:schemeClr>
+            </a:solidFill>
+            <a:prstDash val="dash"/>
+          </a:ln>
+        </p:spPr>
+        <p:style>
+          <a:lnRef idx="1">
+            <a:schemeClr val="accent1"/>
+          </a:lnRef>
+          <a:fillRef idx="0">
+            <a:schemeClr val="accent1"/>
+          </a:fillRef>
+          <a:effectRef idx="0">
+            <a:schemeClr val="accent1"/>
+          </a:effectRef>
+          <a:fontRef idx="minor">
+            <a:schemeClr val="tx1"/>
+          </a:fontRef>
+        </p:style>
+      </p:cxnSp>
+      <p:sp>
+        <p:nvSpPr>
+          <p:cNvPr id="7" name="文本框 6">
+            <a:extLst>
+              <a:ext uri="{FF2B5EF4-FFF2-40B4-BE49-F238E27FC236}">
+                <a16:creationId xmlns:a16="http://schemas.microsoft.com/office/drawing/2014/main" id="{FB657D43-34B0-4FC8-BE54-3C2BA4DDB72B}"/>
+              </a:ext>
+            </a:extLst>
+          </p:cNvPr>
+          <p:cNvSpPr txBox="1"/>
+          <p:nvPr/>
+        </p:nvSpPr>
+        <p:spPr>
+          <a:xfrm>
+            <a:off x="992221" y="669303"/>
+            <a:ext cx="4339650" cy="369332"/>
+          </a:xfrm>
+          <a:prstGeom prst="rect">
+            <a:avLst/>
+          </a:prstGeom>
+          <a:noFill/>
+        </p:spPr>
+        <p:txBody>
+          <a:bodyPr wrap="none" rtlCol="0">
+            <a:spAutoFit/>
+          </a:bodyPr>
+          <a:lstStyle/>
+          <a:p>
+            <a:r>
+              <a:rPr lang="en-US" altLang="zh-CN" b="1" dirty="0">
+                <a:latin typeface="Arial" panose="020B0604020202020204" pitchFamily="34" charset="0"/>
+                <a:cs typeface="Arial" panose="020B0604020202020204" pitchFamily="34" charset="0"/>
+              </a:rPr>
+              <a:t>Constructing the polyline subgraphs  </a:t>
+            </a:r>
+            <a:endParaRPr lang="zh-CN" altLang="en-US" b="1" dirty="0">
+              <a:latin typeface="Arial" panose="020B0604020202020204" pitchFamily="34" charset="0"/>
+              <a:cs typeface="Arial" panose="020B0604020202020204" pitchFamily="34" charset="0"/>
+            </a:endParaRPr>
+          </a:p>
+        </p:txBody>
+      </p:sp>
+      <p:sp>
+        <p:nvSpPr>
+          <p:cNvPr id="9" name="文本框 8">
+            <a:extLst>
+              <a:ext uri="{FF2B5EF4-FFF2-40B4-BE49-F238E27FC236}">
+                <a16:creationId xmlns:a16="http://schemas.microsoft.com/office/drawing/2014/main" id="{B829983B-D66B-4BAE-95AE-CD2D4EA6EF57}"/>
+              </a:ext>
+            </a:extLst>
+          </p:cNvPr>
+          <p:cNvSpPr txBox="1"/>
+          <p:nvPr/>
+        </p:nvSpPr>
+        <p:spPr>
+          <a:xfrm>
+            <a:off x="992221" y="1258242"/>
+            <a:ext cx="10428051" cy="1154675"/>
+          </a:xfrm>
+          <a:prstGeom prst="rect">
+            <a:avLst/>
+          </a:prstGeom>
+          <a:noFill/>
+        </p:spPr>
+        <p:txBody>
+          <a:bodyPr wrap="square" rtlCol="0">
+            <a:spAutoFit/>
+          </a:bodyPr>
+          <a:lstStyle/>
+          <a:p>
+            <a:pPr algn="just">
+              <a:lnSpc>
+                <a:spcPct val="150000"/>
+              </a:lnSpc>
+            </a:pPr>
+            <a:r>
+              <a:rPr lang="en-US" altLang="zh-CN" sz="1600" dirty="0">
+                <a:latin typeface="Arial" panose="020B0604020202020204" pitchFamily="34" charset="0"/>
+                <a:cs typeface="Arial" panose="020B0604020202020204" pitchFamily="34" charset="0"/>
+              </a:rPr>
+              <a:t>        This stage is actually the embedding stage. According to the paper, one vector set represents a polyline. As stated before, one lane can be seen as a polyline and the observed trajectory can also be seen as a polyline. So, we will convert these vector sets to polyline level features by constructing the polyline subgraphs.</a:t>
             </a:r>
           </a:p>
         </p:txBody>

</xml_diff>